<commit_message>
Further updates,more refines awaiting prsentation
</commit_message>
<xml_diff>
--- a/Dr. E Nduati, Superviser/Submissions/ENC222-0149_2017_OKOMO_JACOB_1234.pptx
+++ b/Dr. E Nduati, Superviser/Submissions/ENC222-0149_2017_OKOMO_JACOB_1234.pptx
@@ -6,10 +6,10 @@
     <p:sldMasterId id="2147483698" r:id="rId2"/>
   </p:sldMasterIdLst>
   <p:notesMasterIdLst>
-    <p:notesMasterId r:id="rId20"/>
+    <p:notesMasterId r:id="rId19"/>
   </p:notesMasterIdLst>
   <p:handoutMasterIdLst>
-    <p:handoutMasterId r:id="rId21"/>
+    <p:handoutMasterId r:id="rId20"/>
   </p:handoutMasterIdLst>
   <p:sldIdLst>
     <p:sldId id="353" r:id="rId3"/>
@@ -23,12 +23,11 @@
     <p:sldId id="335" r:id="rId11"/>
     <p:sldId id="370" r:id="rId12"/>
     <p:sldId id="372" r:id="rId13"/>
-    <p:sldId id="373" r:id="rId14"/>
-    <p:sldId id="371" r:id="rId15"/>
-    <p:sldId id="377" r:id="rId16"/>
-    <p:sldId id="375" r:id="rId17"/>
-    <p:sldId id="376" r:id="rId18"/>
-    <p:sldId id="324" r:id="rId19"/>
+    <p:sldId id="371" r:id="rId14"/>
+    <p:sldId id="377" r:id="rId15"/>
+    <p:sldId id="378" r:id="rId16"/>
+    <p:sldId id="376" r:id="rId17"/>
+    <p:sldId id="324" r:id="rId18"/>
   </p:sldIdLst>
   <p:sldSz cx="9144000" cy="6858000" type="screen4x3"/>
   <p:notesSz cx="6858000" cy="9947275"/>
@@ -12041,36 +12040,6 @@
       </p:sp>
       <p:pic>
         <p:nvPicPr>
-          <p:cNvPr id="8" name="Picture 7">
-            <a:extLst>
-              <a:ext uri="{FF2B5EF4-FFF2-40B4-BE49-F238E27FC236}">
-                <a16:creationId xmlns:a16="http://schemas.microsoft.com/office/drawing/2014/main" id="{AA8B86FD-EB69-47D5-A5C9-FC3645F1CBFF}"/>
-              </a:ext>
-            </a:extLst>
-          </p:cNvPr>
-          <p:cNvPicPr>
-            <a:picLocks noChangeAspect="1"/>
-          </p:cNvPicPr>
-          <p:nvPr/>
-        </p:nvPicPr>
-        <p:blipFill>
-          <a:blip r:embed="rId2"/>
-          <a:stretch>
-            <a:fillRect/>
-          </a:stretch>
-        </p:blipFill>
-        <p:spPr>
-          <a:xfrm>
-            <a:off x="938733" y="1168002"/>
-            <a:ext cx="6696744" cy="5617369"/>
-          </a:xfrm>
-          <a:prstGeom prst="rect">
-            <a:avLst/>
-          </a:prstGeom>
-        </p:spPr>
-      </p:pic>
-      <p:pic>
-        <p:nvPicPr>
           <p:cNvPr id="9" name="Picture 8">
             <a:extLst>
               <a:ext uri="{FF2B5EF4-FFF2-40B4-BE49-F238E27FC236}">
@@ -12084,7 +12053,7 @@
           <p:nvPr/>
         </p:nvPicPr>
         <p:blipFill>
-          <a:blip r:embed="rId3">
+          <a:blip r:embed="rId2">
             <a:extLst>
               <a:ext uri="{28A0092B-C50C-407E-A947-70E740481C1C}">
                 <a14:useLocalDpi xmlns:a14="http://schemas.microsoft.com/office/drawing/2010/main" val="0"/>
@@ -12097,8 +12066,8 @@
         </p:blipFill>
         <p:spPr>
           <a:xfrm>
-            <a:off x="539552" y="1240383"/>
-            <a:ext cx="3884927" cy="2736304"/>
+            <a:off x="31975" y="1795438"/>
+            <a:ext cx="5096321" cy="3589536"/>
           </a:xfrm>
           <a:prstGeom prst="rect">
             <a:avLst/>
@@ -12121,8 +12090,8 @@
         </p:nvSpPr>
         <p:spPr bwMode="auto">
           <a:xfrm>
-            <a:off x="938733" y="1484784"/>
-            <a:ext cx="857250" cy="247650"/>
+            <a:off x="539552" y="2204864"/>
+            <a:ext cx="1224136" cy="360040"/>
           </a:xfrm>
           <a:prstGeom prst="rect">
             <a:avLst/>
@@ -12157,7 +12126,7 @@
               </a:spcAft>
             </a:pPr>
             <a:r>
-              <a:rPr lang="en-US" sz="800" dirty="0">
+              <a:rPr lang="en-US" sz="1100" dirty="0">
                 <a:solidFill>
                   <a:srgbClr val="000000"/>
                 </a:solidFill>
@@ -12169,7 +12138,7 @@
               <a:t>R = </a:t>
             </a:r>
             <a:r>
-              <a:rPr lang="en-US" sz="800" dirty="0">
+              <a:rPr lang="en-US" sz="1100" dirty="0">
                 <a:solidFill>
                   <a:srgbClr val="000000"/>
                 </a:solidFill>
@@ -12248,6 +12217,381 @@
           </a:p>
         </p:txBody>
       </p:sp>
+      <p:graphicFrame>
+        <p:nvGraphicFramePr>
+          <p:cNvPr id="11" name="Table 11">
+            <a:extLst>
+              <a:ext uri="{FF2B5EF4-FFF2-40B4-BE49-F238E27FC236}">
+                <a16:creationId xmlns:a16="http://schemas.microsoft.com/office/drawing/2014/main" id="{D6C9D746-9B16-4B4E-8369-C7D41287A0C9}"/>
+              </a:ext>
+            </a:extLst>
+          </p:cNvPr>
+          <p:cNvGraphicFramePr>
+            <a:graphicFrameLocks noGrp="1"/>
+          </p:cNvGraphicFramePr>
+          <p:nvPr>
+            <p:extLst>
+              <p:ext uri="{D42A27DB-BD31-4B8C-83A1-F6EECF244321}">
+                <p14:modId xmlns:p14="http://schemas.microsoft.com/office/powerpoint/2010/main" val="3763706422"/>
+              </p:ext>
+            </p:extLst>
+          </p:nvPr>
+        </p:nvGraphicFramePr>
+        <p:xfrm>
+          <a:off x="5102428" y="1988840"/>
+          <a:ext cx="3790052" cy="3096345"/>
+        </p:xfrm>
+        <a:graphic>
+          <a:graphicData uri="http://schemas.openxmlformats.org/drawingml/2006/table">
+            <a:tbl>
+              <a:tblPr firstRow="1" bandRow="1">
+                <a:tableStyleId>{00A15C55-8517-42AA-B614-E9B94910E393}</a:tableStyleId>
+              </a:tblPr>
+              <a:tblGrid>
+                <a:gridCol w="981740">
+                  <a:extLst>
+                    <a:ext uri="{9D8B030D-6E8A-4147-A177-3AD203B41FA5}">
+                      <a16:colId xmlns:a16="http://schemas.microsoft.com/office/drawing/2014/main" val="2239991187"/>
+                    </a:ext>
+                  </a:extLst>
+                </a:gridCol>
+                <a:gridCol w="2808312">
+                  <a:extLst>
+                    <a:ext uri="{9D8B030D-6E8A-4147-A177-3AD203B41FA5}">
+                      <a16:colId xmlns:a16="http://schemas.microsoft.com/office/drawing/2014/main" val="1677367209"/>
+                    </a:ext>
+                  </a:extLst>
+                </a:gridCol>
+              </a:tblGrid>
+              <a:tr h="442335">
+                <a:tc>
+                  <a:txBody>
+                    <a:bodyPr/>
+                    <a:lstStyle/>
+                    <a:p>
+                      <a:r>
+                        <a:rPr lang="en-US" dirty="0"/>
+                        <a:t>Year</a:t>
+                      </a:r>
+                    </a:p>
+                  </a:txBody>
+                  <a:tcPr/>
+                </a:tc>
+                <a:tc>
+                  <a:txBody>
+                    <a:bodyPr/>
+                    <a:lstStyle/>
+                    <a:p>
+                      <a:r>
+                        <a:rPr lang="en-US" dirty="0"/>
+                        <a:t>Correlation Co-efficient</a:t>
+                      </a:r>
+                    </a:p>
+                  </a:txBody>
+                  <a:tcPr/>
+                </a:tc>
+                <a:extLst>
+                  <a:ext uri="{0D108BD9-81ED-4DB2-BD59-A6C34878D82A}">
+                    <a16:rowId xmlns:a16="http://schemas.microsoft.com/office/drawing/2014/main" val="1039866080"/>
+                  </a:ext>
+                </a:extLst>
+              </a:tr>
+              <a:tr h="442335">
+                <a:tc>
+                  <a:txBody>
+                    <a:bodyPr/>
+                    <a:lstStyle/>
+                    <a:p>
+                      <a:r>
+                        <a:rPr lang="en-US" dirty="0"/>
+                        <a:t>2015</a:t>
+                      </a:r>
+                    </a:p>
+                  </a:txBody>
+                  <a:tcPr/>
+                </a:tc>
+                <a:tc>
+                  <a:txBody>
+                    <a:bodyPr/>
+                    <a:lstStyle/>
+                    <a:p>
+                      <a:r>
+                        <a:rPr lang="en-US" sz="1800" dirty="0">
+                          <a:solidFill>
+                            <a:srgbClr val="000000"/>
+                          </a:solidFill>
+                          <a:effectLst/>
+                        </a:rPr>
+                        <a:t>0.847751</a:t>
+                      </a:r>
+                      <a:endParaRPr lang="en-US" dirty="0"/>
+                    </a:p>
+                  </a:txBody>
+                  <a:tcPr/>
+                </a:tc>
+                <a:extLst>
+                  <a:ext uri="{0D108BD9-81ED-4DB2-BD59-A6C34878D82A}">
+                    <a16:rowId xmlns:a16="http://schemas.microsoft.com/office/drawing/2014/main" val="2033814693"/>
+                  </a:ext>
+                </a:extLst>
+              </a:tr>
+              <a:tr h="442335">
+                <a:tc>
+                  <a:txBody>
+                    <a:bodyPr/>
+                    <a:lstStyle/>
+                    <a:p>
+                      <a:r>
+                        <a:rPr lang="en-US" dirty="0"/>
+                        <a:t>2016</a:t>
+                      </a:r>
+                    </a:p>
+                  </a:txBody>
+                  <a:tcPr/>
+                </a:tc>
+                <a:tc>
+                  <a:txBody>
+                    <a:bodyPr/>
+                    <a:lstStyle/>
+                    <a:p>
+                      <a:pPr marL="0" marR="0" lvl="0" indent="0" algn="l" defTabSz="914400" rtl="0" eaLnBrk="1" fontAlgn="auto" latinLnBrk="0" hangingPunct="1">
+                        <a:lnSpc>
+                          <a:spcPct val="100000"/>
+                        </a:lnSpc>
+                        <a:spcBef>
+                          <a:spcPts val="0"/>
+                        </a:spcBef>
+                        <a:spcAft>
+                          <a:spcPts val="0"/>
+                        </a:spcAft>
+                        <a:buClrTx/>
+                        <a:buSzTx/>
+                        <a:buFontTx/>
+                        <a:buNone/>
+                        <a:tabLst/>
+                        <a:defRPr/>
+                      </a:pPr>
+                      <a:r>
+                        <a:rPr lang="en-US" sz="1800" kern="1200" dirty="0">
+                          <a:solidFill>
+                            <a:schemeClr val="dk1"/>
+                          </a:solidFill>
+                          <a:effectLst/>
+                        </a:rPr>
+                        <a:t>0.883304</a:t>
+                      </a:r>
+                      <a:endParaRPr lang="en-US" sz="1800" kern="1200" dirty="0">
+                        <a:solidFill>
+                          <a:schemeClr val="dk1"/>
+                        </a:solidFill>
+                        <a:effectLst/>
+                        <a:latin typeface="+mn-lt"/>
+                        <a:ea typeface="+mn-ea"/>
+                        <a:cs typeface="+mn-cs"/>
+                      </a:endParaRPr>
+                    </a:p>
+                  </a:txBody>
+                  <a:tcPr/>
+                </a:tc>
+                <a:extLst>
+                  <a:ext uri="{0D108BD9-81ED-4DB2-BD59-A6C34878D82A}">
+                    <a16:rowId xmlns:a16="http://schemas.microsoft.com/office/drawing/2014/main" val="3586125867"/>
+                  </a:ext>
+                </a:extLst>
+              </a:tr>
+              <a:tr h="442335">
+                <a:tc>
+                  <a:txBody>
+                    <a:bodyPr/>
+                    <a:lstStyle/>
+                    <a:p>
+                      <a:r>
+                        <a:rPr lang="en-US" dirty="0"/>
+                        <a:t>2017</a:t>
+                      </a:r>
+                    </a:p>
+                  </a:txBody>
+                  <a:tcPr/>
+                </a:tc>
+                <a:tc>
+                  <a:txBody>
+                    <a:bodyPr/>
+                    <a:lstStyle/>
+                    <a:p>
+                      <a:r>
+                        <a:rPr lang="en-US" dirty="0"/>
+                        <a:t>0.</a:t>
+                      </a:r>
+                      <a:r>
+                        <a:rPr lang="en-US" sz="1800" kern="1200" dirty="0">
+                          <a:solidFill>
+                            <a:schemeClr val="dk1"/>
+                          </a:solidFill>
+                          <a:effectLst/>
+                        </a:rPr>
+                        <a:t>891017</a:t>
+                      </a:r>
+                      <a:endParaRPr lang="en-US" dirty="0"/>
+                    </a:p>
+                  </a:txBody>
+                  <a:tcPr/>
+                </a:tc>
+                <a:extLst>
+                  <a:ext uri="{0D108BD9-81ED-4DB2-BD59-A6C34878D82A}">
+                    <a16:rowId xmlns:a16="http://schemas.microsoft.com/office/drawing/2014/main" val="1400760143"/>
+                  </a:ext>
+                </a:extLst>
+              </a:tr>
+              <a:tr h="442335">
+                <a:tc>
+                  <a:txBody>
+                    <a:bodyPr/>
+                    <a:lstStyle/>
+                    <a:p>
+                      <a:r>
+                        <a:rPr lang="en-US" dirty="0"/>
+                        <a:t>2018</a:t>
+                      </a:r>
+                    </a:p>
+                  </a:txBody>
+                  <a:tcPr/>
+                </a:tc>
+                <a:tc>
+                  <a:txBody>
+                    <a:bodyPr/>
+                    <a:lstStyle/>
+                    <a:p>
+                      <a:pPr marL="0" marR="0" lvl="0" indent="0" algn="l" defTabSz="914400" rtl="0" eaLnBrk="1" fontAlgn="auto" latinLnBrk="0" hangingPunct="1">
+                        <a:lnSpc>
+                          <a:spcPct val="100000"/>
+                        </a:lnSpc>
+                        <a:spcBef>
+                          <a:spcPts val="0"/>
+                        </a:spcBef>
+                        <a:spcAft>
+                          <a:spcPts val="0"/>
+                        </a:spcAft>
+                        <a:buClrTx/>
+                        <a:buSzTx/>
+                        <a:buFontTx/>
+                        <a:buNone/>
+                        <a:tabLst/>
+                        <a:defRPr/>
+                      </a:pPr>
+                      <a:r>
+                        <a:rPr lang="en-US" sz="1800" kern="1200" dirty="0">
+                          <a:solidFill>
+                            <a:schemeClr val="dk1"/>
+                          </a:solidFill>
+                          <a:effectLst/>
+                        </a:rPr>
+                        <a:t>0.843381</a:t>
+                      </a:r>
+                      <a:endParaRPr lang="en-US" sz="1800" kern="1200" dirty="0">
+                        <a:solidFill>
+                          <a:schemeClr val="dk1"/>
+                        </a:solidFill>
+                        <a:effectLst/>
+                        <a:latin typeface="+mn-lt"/>
+                        <a:ea typeface="+mn-ea"/>
+                        <a:cs typeface="+mn-cs"/>
+                      </a:endParaRPr>
+                    </a:p>
+                  </a:txBody>
+                  <a:tcPr/>
+                </a:tc>
+                <a:extLst>
+                  <a:ext uri="{0D108BD9-81ED-4DB2-BD59-A6C34878D82A}">
+                    <a16:rowId xmlns:a16="http://schemas.microsoft.com/office/drawing/2014/main" val="2818009956"/>
+                  </a:ext>
+                </a:extLst>
+              </a:tr>
+              <a:tr h="442335">
+                <a:tc>
+                  <a:txBody>
+                    <a:bodyPr/>
+                    <a:lstStyle/>
+                    <a:p>
+                      <a:r>
+                        <a:rPr lang="en-US" dirty="0"/>
+                        <a:t>2019</a:t>
+                      </a:r>
+                    </a:p>
+                  </a:txBody>
+                  <a:tcPr/>
+                </a:tc>
+                <a:tc>
+                  <a:txBody>
+                    <a:bodyPr/>
+                    <a:lstStyle/>
+                    <a:p>
+                      <a:r>
+                        <a:rPr lang="en-US" sz="1800" kern="1200" dirty="0">
+                          <a:solidFill>
+                            <a:schemeClr val="dk1"/>
+                          </a:solidFill>
+                          <a:effectLst/>
+                        </a:rPr>
+                        <a:t>0.899546</a:t>
+                      </a:r>
+                      <a:endParaRPr lang="en-US" dirty="0"/>
+                    </a:p>
+                  </a:txBody>
+                  <a:tcPr/>
+                </a:tc>
+                <a:extLst>
+                  <a:ext uri="{0D108BD9-81ED-4DB2-BD59-A6C34878D82A}">
+                    <a16:rowId xmlns:a16="http://schemas.microsoft.com/office/drawing/2014/main" val="2292526460"/>
+                  </a:ext>
+                </a:extLst>
+              </a:tr>
+              <a:tr h="442335">
+                <a:tc>
+                  <a:txBody>
+                    <a:bodyPr/>
+                    <a:lstStyle/>
+                    <a:p>
+                      <a:r>
+                        <a:rPr lang="en-US" dirty="0"/>
+                        <a:t>2020</a:t>
+                      </a:r>
+                    </a:p>
+                  </a:txBody>
+                  <a:tcPr/>
+                </a:tc>
+                <a:tc>
+                  <a:txBody>
+                    <a:bodyPr/>
+                    <a:lstStyle/>
+                    <a:p>
+                      <a:r>
+                        <a:rPr lang="en-US" dirty="0"/>
+                        <a:t>0.</a:t>
+                      </a:r>
+                      <a:r>
+                        <a:rPr lang="en-US" sz="1800" kern="1200" dirty="0">
+                          <a:solidFill>
+                            <a:schemeClr val="dk1"/>
+                          </a:solidFill>
+                          <a:effectLst/>
+                        </a:rPr>
+                        <a:t>900772</a:t>
+                      </a:r>
+                      <a:endParaRPr lang="en-US" dirty="0"/>
+                    </a:p>
+                  </a:txBody>
+                  <a:tcPr/>
+                </a:tc>
+                <a:extLst>
+                  <a:ext uri="{0D108BD9-81ED-4DB2-BD59-A6C34878D82A}">
+                    <a16:rowId xmlns:a16="http://schemas.microsoft.com/office/drawing/2014/main" val="2042811309"/>
+                  </a:ext>
+                </a:extLst>
+              </a:tr>
+            </a:tbl>
+          </a:graphicData>
+        </a:graphic>
+      </p:graphicFrame>
     </p:spTree>
     <p:extLst>
       <p:ext uri="{BB962C8B-B14F-4D97-AF65-F5344CB8AC3E}">
@@ -12262,175 +12606,6 @@
 </file>
 
 <file path=ppt/slides/slide12.xml><?xml version="1.0" encoding="utf-8"?>
-<p:sld xmlns:a="http://schemas.openxmlformats.org/drawingml/2006/main" xmlns:r="http://schemas.openxmlformats.org/officeDocument/2006/relationships" xmlns:p="http://schemas.openxmlformats.org/presentationml/2006/main">
-  <p:cSld>
-    <p:spTree>
-      <p:nvGrpSpPr>
-        <p:cNvPr id="1" name=""/>
-        <p:cNvGrpSpPr/>
-        <p:nvPr/>
-      </p:nvGrpSpPr>
-      <p:grpSpPr>
-        <a:xfrm>
-          <a:off x="0" y="0"/>
-          <a:ext cx="0" cy="0"/>
-          <a:chOff x="0" y="0"/>
-          <a:chExt cx="0" cy="0"/>
-        </a:xfrm>
-      </p:grpSpPr>
-      <p:sp>
-        <p:nvSpPr>
-          <p:cNvPr id="3" name="Footer Placeholder 2">
-            <a:extLst>
-              <a:ext uri="{FF2B5EF4-FFF2-40B4-BE49-F238E27FC236}">
-                <a16:creationId xmlns:a16="http://schemas.microsoft.com/office/drawing/2014/main" id="{2E98216B-C000-42C6-8B2E-8DC903F26429}"/>
-              </a:ext>
-            </a:extLst>
-          </p:cNvPr>
-          <p:cNvSpPr>
-            <a:spLocks noGrp="1"/>
-          </p:cNvSpPr>
-          <p:nvPr>
-            <p:ph type="ftr" sz="quarter" idx="10"/>
-          </p:nvPr>
-        </p:nvSpPr>
-        <p:spPr/>
-        <p:txBody>
-          <a:bodyPr/>
-          <a:lstStyle/>
-          <a:p>
-            <a:pPr>
-              <a:defRPr/>
-            </a:pPr>
-            <a:endParaRPr lang="de-DE"/>
-          </a:p>
-          <a:p>
-            <a:pPr>
-              <a:defRPr/>
-            </a:pPr>
-            <a:endParaRPr lang="de-DE"/>
-          </a:p>
-        </p:txBody>
-      </p:sp>
-      <p:pic>
-        <p:nvPicPr>
-          <p:cNvPr id="5" name="Picture 4">
-            <a:extLst>
-              <a:ext uri="{FF2B5EF4-FFF2-40B4-BE49-F238E27FC236}">
-                <a16:creationId xmlns:a16="http://schemas.microsoft.com/office/drawing/2014/main" id="{5303519A-EDBA-4694-A1A6-49E699DEE423}"/>
-              </a:ext>
-            </a:extLst>
-          </p:cNvPr>
-          <p:cNvPicPr>
-            <a:picLocks noChangeAspect="1"/>
-          </p:cNvPicPr>
-          <p:nvPr/>
-        </p:nvPicPr>
-        <p:blipFill>
-          <a:blip r:embed="rId2">
-            <a:extLst>
-              <a:ext uri="{28A0092B-C50C-407E-A947-70E740481C1C}">
-                <a14:useLocalDpi xmlns:a14="http://schemas.microsoft.com/office/drawing/2010/main" val="0"/>
-              </a:ext>
-            </a:extLst>
-          </a:blip>
-          <a:stretch>
-            <a:fillRect/>
-          </a:stretch>
-        </p:blipFill>
-        <p:spPr>
-          <a:xfrm>
-            <a:off x="185050" y="1695178"/>
-            <a:ext cx="4159521" cy="4027891"/>
-          </a:xfrm>
-          <a:prstGeom prst="rect">
-            <a:avLst/>
-          </a:prstGeom>
-        </p:spPr>
-      </p:pic>
-      <p:pic>
-        <p:nvPicPr>
-          <p:cNvPr id="6" name="Picture 5">
-            <a:extLst>
-              <a:ext uri="{FF2B5EF4-FFF2-40B4-BE49-F238E27FC236}">
-                <a16:creationId xmlns:a16="http://schemas.microsoft.com/office/drawing/2014/main" id="{58831AF8-EA19-4284-8B44-AC133D28604A}"/>
-              </a:ext>
-            </a:extLst>
-          </p:cNvPr>
-          <p:cNvPicPr>
-            <a:picLocks noChangeAspect="1"/>
-          </p:cNvPicPr>
-          <p:nvPr/>
-        </p:nvPicPr>
-        <p:blipFill>
-          <a:blip r:embed="rId3">
-            <a:extLst>
-              <a:ext uri="{28A0092B-C50C-407E-A947-70E740481C1C}">
-                <a14:useLocalDpi xmlns:a14="http://schemas.microsoft.com/office/drawing/2010/main" val="0"/>
-              </a:ext>
-            </a:extLst>
-          </a:blip>
-          <a:stretch>
-            <a:fillRect/>
-          </a:stretch>
-        </p:blipFill>
-        <p:spPr>
-          <a:xfrm>
-            <a:off x="4538326" y="1713347"/>
-            <a:ext cx="4125178" cy="4009722"/>
-          </a:xfrm>
-          <a:prstGeom prst="rect">
-            <a:avLst/>
-          </a:prstGeom>
-        </p:spPr>
-      </p:pic>
-      <p:sp>
-        <p:nvSpPr>
-          <p:cNvPr id="7" name="Title 3">
-            <a:extLst>
-              <a:ext uri="{FF2B5EF4-FFF2-40B4-BE49-F238E27FC236}">
-                <a16:creationId xmlns:a16="http://schemas.microsoft.com/office/drawing/2014/main" id="{D7080D38-FA5C-4DC7-94CF-628CED64250D}"/>
-              </a:ext>
-            </a:extLst>
-          </p:cNvPr>
-          <p:cNvSpPr>
-            <a:spLocks noGrp="1"/>
-          </p:cNvSpPr>
-          <p:nvPr>
-            <p:ph type="title"/>
-          </p:nvPr>
-        </p:nvSpPr>
-        <p:spPr>
-          <a:xfrm>
-            <a:off x="254075" y="488950"/>
-            <a:ext cx="6877050" cy="838200"/>
-          </a:xfrm>
-        </p:spPr>
-        <p:txBody>
-          <a:bodyPr/>
-          <a:lstStyle/>
-          <a:p>
-            <a:r>
-              <a:rPr lang="en-US" dirty="0"/>
-              <a:t>Accuracy Assessment of Chl-a Estimates</a:t>
-            </a:r>
-          </a:p>
-        </p:txBody>
-      </p:sp>
-    </p:spTree>
-    <p:extLst>
-      <p:ext uri="{BB962C8B-B14F-4D97-AF65-F5344CB8AC3E}">
-        <p14:creationId xmlns:p14="http://schemas.microsoft.com/office/powerpoint/2010/main" val="155833479"/>
-      </p:ext>
-    </p:extLst>
-  </p:cSld>
-  <p:clrMapOvr>
-    <a:masterClrMapping/>
-  </p:clrMapOvr>
-</p:sld>
-</file>
-
-<file path=ppt/slides/slide13.xml><?xml version="1.0" encoding="utf-8"?>
 <p:sld xmlns:a="http://schemas.openxmlformats.org/drawingml/2006/main" xmlns:r="http://schemas.openxmlformats.org/officeDocument/2006/relationships" xmlns:p="http://schemas.openxmlformats.org/presentationml/2006/main">
   <p:cSld>
     <p:spTree>
@@ -12721,7 +12896,7 @@
                 <a:ea typeface="Calibri" panose="020F0502020204030204" pitchFamily="34" charset="0"/>
                 <a:cs typeface="Times New Roman" panose="02020603050405020304" pitchFamily="18" charset="0"/>
               </a:rPr>
-              <a:t> July 2016</a:t>
+              <a:t> February 2016</a:t>
             </a:r>
             <a:endParaRPr lang="en-US" sz="1100" dirty="0">
               <a:effectLst/>
@@ -12838,7 +13013,7 @@
                 <a:ea typeface="Calibri" panose="020F0502020204030204" pitchFamily="34" charset="0"/>
                 <a:cs typeface="Times New Roman" panose="02020603050405020304" pitchFamily="18" charset="0"/>
               </a:rPr>
-              <a:t> August 2017								27</a:t>
+              <a:t> September 2017								27</a:t>
             </a:r>
             <a:r>
               <a:rPr lang="en-US" sz="1100" b="1" baseline="30000" dirty="0">
@@ -12913,7 +13088,7 @@
 </p:sld>
 </file>
 
-<file path=ppt/slides/slide14.xml><?xml version="1.0" encoding="utf-8"?>
+<file path=ppt/slides/slide13.xml><?xml version="1.0" encoding="utf-8"?>
 <p:sld xmlns:a="http://schemas.openxmlformats.org/drawingml/2006/main" xmlns:r="http://schemas.openxmlformats.org/officeDocument/2006/relationships" xmlns:p="http://schemas.openxmlformats.org/presentationml/2006/main">
   <p:cSld>
     <p:spTree>
@@ -13198,7 +13373,7 @@
 </p:sld>
 </file>
 
-<file path=ppt/slides/slide15.xml><?xml version="1.0" encoding="utf-8"?>
+<file path=ppt/slides/slide14.xml><?xml version="1.0" encoding="utf-8"?>
 <p:sld xmlns:a="http://schemas.openxmlformats.org/drawingml/2006/main" xmlns:r="http://schemas.openxmlformats.org/officeDocument/2006/relationships" xmlns:p="http://schemas.openxmlformats.org/presentationml/2006/main">
   <p:cSld>
     <p:spTree>
@@ -13217,35 +13392,10 @@
       </p:grpSpPr>
       <p:sp>
         <p:nvSpPr>
-          <p:cNvPr id="2" name="Text Placeholder 1">
-            <a:extLst>
-              <a:ext uri="{FF2B5EF4-FFF2-40B4-BE49-F238E27FC236}">
-                <a16:creationId xmlns:a16="http://schemas.microsoft.com/office/drawing/2014/main" id="{23DC5B2F-8EA6-4879-8E65-CA8323F04222}"/>
-              </a:ext>
-            </a:extLst>
-          </p:cNvPr>
-          <p:cNvSpPr>
-            <a:spLocks noGrp="1"/>
-          </p:cNvSpPr>
-          <p:nvPr>
-            <p:ph type="body" idx="1"/>
-          </p:nvPr>
-        </p:nvSpPr>
-        <p:spPr/>
-        <p:txBody>
-          <a:bodyPr/>
-          <a:lstStyle/>
-          <a:p>
-            <a:endParaRPr lang="en-US" dirty="0"/>
-          </a:p>
-        </p:txBody>
-      </p:sp>
-      <p:sp>
-        <p:nvSpPr>
           <p:cNvPr id="3" name="Footer Placeholder 2">
             <a:extLst>
               <a:ext uri="{FF2B5EF4-FFF2-40B4-BE49-F238E27FC236}">
-                <a16:creationId xmlns:a16="http://schemas.microsoft.com/office/drawing/2014/main" id="{5DC7F989-FEFB-4CE0-A0DB-62DE2C8062C3}"/>
+                <a16:creationId xmlns:a16="http://schemas.microsoft.com/office/drawing/2014/main" id="{902F3726-A8BC-4A8A-B7E4-50E1E6DCBD6E}"/>
               </a:ext>
             </a:extLst>
           </p:cNvPr>
@@ -13279,7 +13429,7 @@
           <p:cNvPr id="5" name="Title 3">
             <a:extLst>
               <a:ext uri="{FF2B5EF4-FFF2-40B4-BE49-F238E27FC236}">
-                <a16:creationId xmlns:a16="http://schemas.microsoft.com/office/drawing/2014/main" id="{CB3CFE5A-59BB-4F9F-8A24-44A0C9EBFC1F}"/>
+                <a16:creationId xmlns:a16="http://schemas.microsoft.com/office/drawing/2014/main" id="{F9872FDF-036E-4733-A3F7-566480C1A7B1}"/>
               </a:ext>
             </a:extLst>
           </p:cNvPr>
@@ -13307,10 +13457,573 @@
           </a:p>
         </p:txBody>
       </p:sp>
+      <p:graphicFrame>
+        <p:nvGraphicFramePr>
+          <p:cNvPr id="8" name="Table 11">
+            <a:extLst>
+              <a:ext uri="{FF2B5EF4-FFF2-40B4-BE49-F238E27FC236}">
+                <a16:creationId xmlns:a16="http://schemas.microsoft.com/office/drawing/2014/main" id="{6364ECFD-ED7A-455C-ACE3-AD1CEC3DB71C}"/>
+              </a:ext>
+            </a:extLst>
+          </p:cNvPr>
+          <p:cNvGraphicFramePr>
+            <a:graphicFrameLocks noGrp="1"/>
+          </p:cNvGraphicFramePr>
+          <p:nvPr>
+            <p:extLst>
+              <p:ext uri="{D42A27DB-BD31-4B8C-83A1-F6EECF244321}">
+                <p14:modId xmlns:p14="http://schemas.microsoft.com/office/powerpoint/2010/main" val="2908309655"/>
+              </p:ext>
+            </p:extLst>
+          </p:nvPr>
+        </p:nvGraphicFramePr>
+        <p:xfrm>
+          <a:off x="5652120" y="1520788"/>
+          <a:ext cx="3330044" cy="3816425"/>
+        </p:xfrm>
+        <a:graphic>
+          <a:graphicData uri="http://schemas.openxmlformats.org/drawingml/2006/table">
+            <a:tbl>
+              <a:tblPr firstRow="1" bandRow="1">
+                <a:tableStyleId>{00A15C55-8517-42AA-B614-E9B94910E393}</a:tableStyleId>
+              </a:tblPr>
+              <a:tblGrid>
+                <a:gridCol w="862584">
+                  <a:extLst>
+                    <a:ext uri="{9D8B030D-6E8A-4147-A177-3AD203B41FA5}">
+                      <a16:colId xmlns:a16="http://schemas.microsoft.com/office/drawing/2014/main" val="2239991187"/>
+                    </a:ext>
+                  </a:extLst>
+                </a:gridCol>
+                <a:gridCol w="2467460">
+                  <a:extLst>
+                    <a:ext uri="{9D8B030D-6E8A-4147-A177-3AD203B41FA5}">
+                      <a16:colId xmlns:a16="http://schemas.microsoft.com/office/drawing/2014/main" val="1677367209"/>
+                    </a:ext>
+                  </a:extLst>
+                </a:gridCol>
+              </a:tblGrid>
+              <a:tr h="678053">
+                <a:tc>
+                  <a:txBody>
+                    <a:bodyPr/>
+                    <a:lstStyle/>
+                    <a:p>
+                      <a:r>
+                        <a:rPr lang="en-US" dirty="0"/>
+                        <a:t>Year</a:t>
+                      </a:r>
+                    </a:p>
+                  </a:txBody>
+                  <a:tcPr/>
+                </a:tc>
+                <a:tc>
+                  <a:txBody>
+                    <a:bodyPr/>
+                    <a:lstStyle/>
+                    <a:p>
+                      <a:r>
+                        <a:rPr lang="en-US" dirty="0" err="1"/>
+                        <a:t>Correl’n</a:t>
+                      </a:r>
+                      <a:r>
+                        <a:rPr lang="en-US" dirty="0"/>
+                        <a:t> Co-efficient</a:t>
+                      </a:r>
+                    </a:p>
+                  </a:txBody>
+                  <a:tcPr/>
+                </a:tc>
+                <a:extLst>
+                  <a:ext uri="{0D108BD9-81ED-4DB2-BD59-A6C34878D82A}">
+                    <a16:rowId xmlns:a16="http://schemas.microsoft.com/office/drawing/2014/main" val="1039866080"/>
+                  </a:ext>
+                </a:extLst>
+              </a:tr>
+              <a:tr h="523062">
+                <a:tc>
+                  <a:txBody>
+                    <a:bodyPr/>
+                    <a:lstStyle/>
+                    <a:p>
+                      <a:r>
+                        <a:rPr lang="en-US" dirty="0"/>
+                        <a:t>2015</a:t>
+                      </a:r>
+                    </a:p>
+                  </a:txBody>
+                  <a:tcPr/>
+                </a:tc>
+                <a:tc>
+                  <a:txBody>
+                    <a:bodyPr/>
+                    <a:lstStyle/>
+                    <a:p>
+                      <a:r>
+                        <a:rPr lang="en-US" sz="1800" dirty="0">
+                          <a:solidFill>
+                            <a:srgbClr val="000000"/>
+                          </a:solidFill>
+                          <a:effectLst/>
+                        </a:rPr>
+                        <a:t>0.698326</a:t>
+                      </a:r>
+                      <a:endParaRPr lang="en-US" dirty="0"/>
+                    </a:p>
+                  </a:txBody>
+                  <a:tcPr/>
+                </a:tc>
+                <a:extLst>
+                  <a:ext uri="{0D108BD9-81ED-4DB2-BD59-A6C34878D82A}">
+                    <a16:rowId xmlns:a16="http://schemas.microsoft.com/office/drawing/2014/main" val="2033814693"/>
+                  </a:ext>
+                </a:extLst>
+              </a:tr>
+              <a:tr h="523062">
+                <a:tc>
+                  <a:txBody>
+                    <a:bodyPr/>
+                    <a:lstStyle/>
+                    <a:p>
+                      <a:r>
+                        <a:rPr lang="en-US" dirty="0"/>
+                        <a:t>2016</a:t>
+                      </a:r>
+                    </a:p>
+                  </a:txBody>
+                  <a:tcPr/>
+                </a:tc>
+                <a:tc>
+                  <a:txBody>
+                    <a:bodyPr/>
+                    <a:lstStyle/>
+                    <a:p>
+                      <a:pPr marL="0" marR="0" lvl="0" indent="0" algn="l" defTabSz="914400" rtl="0" eaLnBrk="1" fontAlgn="auto" latinLnBrk="0" hangingPunct="1">
+                        <a:lnSpc>
+                          <a:spcPct val="100000"/>
+                        </a:lnSpc>
+                        <a:spcBef>
+                          <a:spcPts val="0"/>
+                        </a:spcBef>
+                        <a:spcAft>
+                          <a:spcPts val="0"/>
+                        </a:spcAft>
+                        <a:buClrTx/>
+                        <a:buSzTx/>
+                        <a:buFontTx/>
+                        <a:buNone/>
+                        <a:tabLst/>
+                        <a:defRPr/>
+                      </a:pPr>
+                      <a:r>
+                        <a:rPr lang="en-US" sz="1800" kern="1200" dirty="0">
+                          <a:solidFill>
+                            <a:schemeClr val="dk1"/>
+                          </a:solidFill>
+                          <a:effectLst/>
+                        </a:rPr>
+                        <a:t>0. 71064</a:t>
+                      </a:r>
+                      <a:endParaRPr lang="en-US" sz="1800" kern="1200" dirty="0">
+                        <a:solidFill>
+                          <a:schemeClr val="dk1"/>
+                        </a:solidFill>
+                        <a:effectLst/>
+                        <a:latin typeface="+mn-lt"/>
+                        <a:ea typeface="+mn-ea"/>
+                        <a:cs typeface="+mn-cs"/>
+                      </a:endParaRPr>
+                    </a:p>
+                  </a:txBody>
+                  <a:tcPr/>
+                </a:tc>
+                <a:extLst>
+                  <a:ext uri="{0D108BD9-81ED-4DB2-BD59-A6C34878D82A}">
+                    <a16:rowId xmlns:a16="http://schemas.microsoft.com/office/drawing/2014/main" val="3586125867"/>
+                  </a:ext>
+                </a:extLst>
+              </a:tr>
+              <a:tr h="523062">
+                <a:tc>
+                  <a:txBody>
+                    <a:bodyPr/>
+                    <a:lstStyle/>
+                    <a:p>
+                      <a:r>
+                        <a:rPr lang="en-US" dirty="0"/>
+                        <a:t>2017</a:t>
+                      </a:r>
+                    </a:p>
+                  </a:txBody>
+                  <a:tcPr/>
+                </a:tc>
+                <a:tc>
+                  <a:txBody>
+                    <a:bodyPr/>
+                    <a:lstStyle/>
+                    <a:p>
+                      <a:r>
+                        <a:rPr lang="en-US" dirty="0"/>
+                        <a:t>0.</a:t>
+                      </a:r>
+                      <a:r>
+                        <a:rPr lang="en-US" sz="1800" kern="1200" dirty="0">
+                          <a:solidFill>
+                            <a:schemeClr val="dk1"/>
+                          </a:solidFill>
+                          <a:effectLst/>
+                        </a:rPr>
+                        <a:t>691017</a:t>
+                      </a:r>
+                      <a:endParaRPr lang="en-US" dirty="0"/>
+                    </a:p>
+                  </a:txBody>
+                  <a:tcPr/>
+                </a:tc>
+                <a:extLst>
+                  <a:ext uri="{0D108BD9-81ED-4DB2-BD59-A6C34878D82A}">
+                    <a16:rowId xmlns:a16="http://schemas.microsoft.com/office/drawing/2014/main" val="1400760143"/>
+                  </a:ext>
+                </a:extLst>
+              </a:tr>
+              <a:tr h="523062">
+                <a:tc>
+                  <a:txBody>
+                    <a:bodyPr/>
+                    <a:lstStyle/>
+                    <a:p>
+                      <a:r>
+                        <a:rPr lang="en-US" dirty="0"/>
+                        <a:t>2018</a:t>
+                      </a:r>
+                    </a:p>
+                  </a:txBody>
+                  <a:tcPr/>
+                </a:tc>
+                <a:tc>
+                  <a:txBody>
+                    <a:bodyPr/>
+                    <a:lstStyle/>
+                    <a:p>
+                      <a:pPr marL="0" marR="0" lvl="0" indent="0" algn="l" defTabSz="914400" rtl="0" eaLnBrk="1" fontAlgn="auto" latinLnBrk="0" hangingPunct="1">
+                        <a:lnSpc>
+                          <a:spcPct val="100000"/>
+                        </a:lnSpc>
+                        <a:spcBef>
+                          <a:spcPts val="0"/>
+                        </a:spcBef>
+                        <a:spcAft>
+                          <a:spcPts val="0"/>
+                        </a:spcAft>
+                        <a:buClrTx/>
+                        <a:buSzTx/>
+                        <a:buFontTx/>
+                        <a:buNone/>
+                        <a:tabLst/>
+                        <a:defRPr/>
+                      </a:pPr>
+                      <a:r>
+                        <a:rPr lang="en-US" sz="1800" kern="1200" dirty="0">
+                          <a:solidFill>
+                            <a:schemeClr val="dk1"/>
+                          </a:solidFill>
+                          <a:effectLst/>
+                        </a:rPr>
+                        <a:t>0.713381</a:t>
+                      </a:r>
+                      <a:endParaRPr lang="en-US" sz="1800" kern="1200" dirty="0">
+                        <a:solidFill>
+                          <a:schemeClr val="dk1"/>
+                        </a:solidFill>
+                        <a:effectLst/>
+                        <a:latin typeface="+mn-lt"/>
+                        <a:ea typeface="+mn-ea"/>
+                        <a:cs typeface="+mn-cs"/>
+                      </a:endParaRPr>
+                    </a:p>
+                  </a:txBody>
+                  <a:tcPr/>
+                </a:tc>
+                <a:extLst>
+                  <a:ext uri="{0D108BD9-81ED-4DB2-BD59-A6C34878D82A}">
+                    <a16:rowId xmlns:a16="http://schemas.microsoft.com/office/drawing/2014/main" val="2818009956"/>
+                  </a:ext>
+                </a:extLst>
+              </a:tr>
+              <a:tr h="523062">
+                <a:tc>
+                  <a:txBody>
+                    <a:bodyPr/>
+                    <a:lstStyle/>
+                    <a:p>
+                      <a:r>
+                        <a:rPr lang="en-US" dirty="0"/>
+                        <a:t>2019</a:t>
+                      </a:r>
+                    </a:p>
+                  </a:txBody>
+                  <a:tcPr/>
+                </a:tc>
+                <a:tc>
+                  <a:txBody>
+                    <a:bodyPr/>
+                    <a:lstStyle/>
+                    <a:p>
+                      <a:r>
+                        <a:rPr lang="en-US" sz="1800" kern="1200" dirty="0">
+                          <a:solidFill>
+                            <a:schemeClr val="dk1"/>
+                          </a:solidFill>
+                          <a:effectLst/>
+                        </a:rPr>
+                        <a:t>0. 71546</a:t>
+                      </a:r>
+                      <a:endParaRPr lang="en-US" dirty="0"/>
+                    </a:p>
+                  </a:txBody>
+                  <a:tcPr/>
+                </a:tc>
+                <a:extLst>
+                  <a:ext uri="{0D108BD9-81ED-4DB2-BD59-A6C34878D82A}">
+                    <a16:rowId xmlns:a16="http://schemas.microsoft.com/office/drawing/2014/main" val="2292526460"/>
+                  </a:ext>
+                </a:extLst>
+              </a:tr>
+              <a:tr h="523062">
+                <a:tc>
+                  <a:txBody>
+                    <a:bodyPr/>
+                    <a:lstStyle/>
+                    <a:p>
+                      <a:r>
+                        <a:rPr lang="en-US" dirty="0"/>
+                        <a:t>2020</a:t>
+                      </a:r>
+                    </a:p>
+                  </a:txBody>
+                  <a:tcPr/>
+                </a:tc>
+                <a:tc>
+                  <a:txBody>
+                    <a:bodyPr/>
+                    <a:lstStyle/>
+                    <a:p>
+                      <a:r>
+                        <a:rPr lang="en-US" dirty="0"/>
+                        <a:t>0.</a:t>
+                      </a:r>
+                      <a:r>
+                        <a:rPr lang="en-US" sz="1800" kern="1200" dirty="0">
+                          <a:solidFill>
+                            <a:schemeClr val="dk1"/>
+                          </a:solidFill>
+                          <a:effectLst/>
+                        </a:rPr>
+                        <a:t> 70726</a:t>
+                      </a:r>
+                      <a:endParaRPr lang="en-US" dirty="0"/>
+                    </a:p>
+                  </a:txBody>
+                  <a:tcPr/>
+                </a:tc>
+                <a:extLst>
+                  <a:ext uri="{0D108BD9-81ED-4DB2-BD59-A6C34878D82A}">
+                    <a16:rowId xmlns:a16="http://schemas.microsoft.com/office/drawing/2014/main" val="2042811309"/>
+                  </a:ext>
+                </a:extLst>
+              </a:tr>
+            </a:tbl>
+          </a:graphicData>
+        </a:graphic>
+      </p:graphicFrame>
+      <p:pic>
+        <p:nvPicPr>
+          <p:cNvPr id="12" name="Picture 11">
+            <a:extLst>
+              <a:ext uri="{FF2B5EF4-FFF2-40B4-BE49-F238E27FC236}">
+                <a16:creationId xmlns:a16="http://schemas.microsoft.com/office/drawing/2014/main" id="{7DE26C30-C6D4-4365-BCD8-AB93F9B4C221}"/>
+              </a:ext>
+            </a:extLst>
+          </p:cNvPr>
+          <p:cNvPicPr>
+            <a:picLocks noChangeAspect="1"/>
+          </p:cNvPicPr>
+          <p:nvPr/>
+        </p:nvPicPr>
+        <p:blipFill>
+          <a:blip r:embed="rId2"/>
+          <a:stretch>
+            <a:fillRect/>
+          </a:stretch>
+        </p:blipFill>
+        <p:spPr>
+          <a:xfrm>
+            <a:off x="166516" y="1473049"/>
+            <a:ext cx="5401295" cy="3911901"/>
+          </a:xfrm>
+          <a:prstGeom prst="rect">
+            <a:avLst/>
+          </a:prstGeom>
+        </p:spPr>
+      </p:pic>
+      <p:sp>
+        <p:nvSpPr>
+          <p:cNvPr id="13" name="Text Box 2">
+            <a:extLst>
+              <a:ext uri="{FF2B5EF4-FFF2-40B4-BE49-F238E27FC236}">
+                <a16:creationId xmlns:a16="http://schemas.microsoft.com/office/drawing/2014/main" id="{00F85F26-3905-4BE7-83CC-0EA1C8F683DC}"/>
+              </a:ext>
+            </a:extLst>
+          </p:cNvPr>
+          <p:cNvSpPr txBox="1">
+            <a:spLocks noChangeArrowheads="1"/>
+          </p:cNvSpPr>
+          <p:nvPr/>
+        </p:nvSpPr>
+        <p:spPr bwMode="auto">
+          <a:xfrm>
+            <a:off x="683568" y="2059129"/>
+            <a:ext cx="1224136" cy="360040"/>
+          </a:xfrm>
+          <a:prstGeom prst="rect">
+            <a:avLst/>
+          </a:prstGeom>
+          <a:solidFill>
+            <a:srgbClr val="FFFFFF"/>
+          </a:solidFill>
+          <a:ln w="9525">
+            <a:solidFill>
+              <a:schemeClr val="bg1"/>
+            </a:solidFill>
+            <a:miter lim="800000"/>
+            <a:headEnd/>
+            <a:tailEnd/>
+          </a:ln>
+        </p:spPr>
+        <p:txBody>
+          <a:bodyPr rot="0" vert="horz" wrap="square" lIns="91440" tIns="45720" rIns="91440" bIns="45720" anchor="t" anchorCtr="0">
+            <a:noAutofit/>
+          </a:bodyPr>
+          <a:lstStyle/>
+          <a:p>
+            <a:pPr algn="l">
+              <a:lnSpc>
+                <a:spcPct val="150000"/>
+              </a:lnSpc>
+              <a:spcBef>
+                <a:spcPts val="0"/>
+              </a:spcBef>
+              <a:spcAft>
+                <a:spcPts val="800"/>
+              </a:spcAft>
+            </a:pPr>
+            <a:r>
+              <a:rPr lang="en-US" sz="1100" dirty="0">
+                <a:solidFill>
+                  <a:srgbClr val="000000"/>
+                </a:solidFill>
+                <a:effectLst/>
+                <a:latin typeface="Verdana" panose="020B0604030504040204" pitchFamily="34" charset="0"/>
+                <a:ea typeface="Calibri" panose="020F0502020204030204" pitchFamily="34" charset="0"/>
+                <a:cs typeface="Times New Roman" panose="02020603050405020304" pitchFamily="18" charset="0"/>
+              </a:rPr>
+              <a:t>R = </a:t>
+            </a:r>
+            <a:r>
+              <a:rPr lang="en-US" sz="1100" dirty="0">
+                <a:solidFill>
+                  <a:srgbClr val="000000"/>
+                </a:solidFill>
+                <a:effectLst/>
+              </a:rPr>
+              <a:t>0.698326</a:t>
+            </a:r>
+            <a:endParaRPr lang="en-US" sz="1100" dirty="0"/>
+          </a:p>
+          <a:p>
+            <a:pPr marL="0" marR="0" algn="l">
+              <a:lnSpc>
+                <a:spcPct val="150000"/>
+              </a:lnSpc>
+              <a:spcBef>
+                <a:spcPts val="0"/>
+              </a:spcBef>
+              <a:spcAft>
+                <a:spcPts val="800"/>
+              </a:spcAft>
+            </a:pPr>
+            <a:endParaRPr lang="en-US" sz="1100" dirty="0">
+              <a:effectLst/>
+              <a:latin typeface="Verdana" panose="020B0604030504040204" pitchFamily="34" charset="0"/>
+              <a:ea typeface="Calibri" panose="020F0502020204030204" pitchFamily="34" charset="0"/>
+              <a:cs typeface="Times New Roman" panose="02020603050405020304" pitchFamily="18" charset="0"/>
+            </a:endParaRPr>
+          </a:p>
+          <a:p>
+            <a:pPr marL="0" marR="0" algn="l">
+              <a:lnSpc>
+                <a:spcPct val="150000"/>
+              </a:lnSpc>
+              <a:spcBef>
+                <a:spcPts val="0"/>
+              </a:spcBef>
+              <a:spcAft>
+                <a:spcPts val="800"/>
+              </a:spcAft>
+            </a:pPr>
+            <a:r>
+              <a:rPr lang="en-US" sz="800" dirty="0">
+                <a:solidFill>
+                  <a:srgbClr val="000000"/>
+                </a:solidFill>
+                <a:effectLst/>
+                <a:latin typeface="Segoe UI" panose="020B0502040204020203" pitchFamily="34" charset="0"/>
+                <a:ea typeface="Times New Roman" panose="02020603050405020304" pitchFamily="18" charset="0"/>
+                <a:cs typeface="Times New Roman" panose="02020603050405020304" pitchFamily="18" charset="0"/>
+              </a:rPr>
+              <a:t> </a:t>
+            </a:r>
+            <a:endParaRPr lang="en-US" sz="1100" dirty="0">
+              <a:effectLst/>
+              <a:latin typeface="Verdana" panose="020B0604030504040204" pitchFamily="34" charset="0"/>
+              <a:ea typeface="Calibri" panose="020F0502020204030204" pitchFamily="34" charset="0"/>
+              <a:cs typeface="Times New Roman" panose="02020603050405020304" pitchFamily="18" charset="0"/>
+            </a:endParaRPr>
+          </a:p>
+          <a:p>
+            <a:pPr marL="0" marR="0" algn="l">
+              <a:lnSpc>
+                <a:spcPct val="150000"/>
+              </a:lnSpc>
+              <a:spcBef>
+                <a:spcPts val="0"/>
+              </a:spcBef>
+              <a:spcAft>
+                <a:spcPts val="800"/>
+              </a:spcAft>
+            </a:pPr>
+            <a:r>
+              <a:rPr lang="en-US" sz="800" dirty="0">
+                <a:effectLst/>
+                <a:latin typeface="Verdana" panose="020B0604030504040204" pitchFamily="34" charset="0"/>
+                <a:ea typeface="Calibri" panose="020F0502020204030204" pitchFamily="34" charset="0"/>
+                <a:cs typeface="Times New Roman" panose="02020603050405020304" pitchFamily="18" charset="0"/>
+              </a:rPr>
+              <a:t> </a:t>
+            </a:r>
+            <a:endParaRPr lang="en-US" sz="1100" dirty="0">
+              <a:effectLst/>
+              <a:latin typeface="Verdana" panose="020B0604030504040204" pitchFamily="34" charset="0"/>
+              <a:ea typeface="Calibri" panose="020F0502020204030204" pitchFamily="34" charset="0"/>
+              <a:cs typeface="Times New Roman" panose="02020603050405020304" pitchFamily="18" charset="0"/>
+            </a:endParaRPr>
+          </a:p>
+        </p:txBody>
+      </p:sp>
     </p:spTree>
     <p:extLst>
       <p:ext uri="{BB962C8B-B14F-4D97-AF65-F5344CB8AC3E}">
-        <p14:creationId xmlns:p14="http://schemas.microsoft.com/office/powerpoint/2010/main" val="1892496170"/>
+        <p14:creationId xmlns:p14="http://schemas.microsoft.com/office/powerpoint/2010/main" val="41965513"/>
       </p:ext>
     </p:extLst>
   </p:cSld>
@@ -13320,7 +14033,7 @@
 </p:sld>
 </file>
 
-<file path=ppt/slides/slide16.xml><?xml version="1.0" encoding="utf-8"?>
+<file path=ppt/slides/slide15.xml><?xml version="1.0" encoding="utf-8"?>
 <p:sld xmlns:a="http://schemas.openxmlformats.org/drawingml/2006/main" xmlns:r="http://schemas.openxmlformats.org/officeDocument/2006/relationships" xmlns:p="http://schemas.openxmlformats.org/presentationml/2006/main">
   <p:cSld>
     <p:spTree>
@@ -13482,7 +14195,7 @@
 </p:sld>
 </file>
 
-<file path=ppt/slides/slide17.xml><?xml version="1.0" encoding="utf-8"?>
+<file path=ppt/slides/slide16.xml><?xml version="1.0" encoding="utf-8"?>
 <p:sld xmlns:a="http://schemas.openxmlformats.org/drawingml/2006/main" xmlns:r="http://schemas.openxmlformats.org/officeDocument/2006/relationships" xmlns:p="http://schemas.openxmlformats.org/presentationml/2006/main">
   <p:cSld>
     <p:spTree>
@@ -15691,13 +16404,13 @@
           <p:nvPr>
             <p:extLst>
               <p:ext uri="{D42A27DB-BD31-4B8C-83A1-F6EECF244321}">
-                <p14:modId xmlns:p14="http://schemas.microsoft.com/office/powerpoint/2010/main" val="2897227719"/>
+                <p14:modId xmlns:p14="http://schemas.microsoft.com/office/powerpoint/2010/main" val="1667758896"/>
               </p:ext>
             </p:extLst>
           </p:nvPr>
         </p:nvGraphicFramePr>
         <p:xfrm>
-          <a:off x="235851" y="1454032"/>
+          <a:off x="235851" y="1468438"/>
           <a:ext cx="8641656" cy="2911070"/>
         </p:xfrm>
         <a:graphic>
@@ -21730,36 +22443,6 @@
           </a:p>
         </p:txBody>
       </p:sp>
-      <p:pic>
-        <p:nvPicPr>
-          <p:cNvPr id="6" name="Picture 5">
-            <a:extLst>
-              <a:ext uri="{FF2B5EF4-FFF2-40B4-BE49-F238E27FC236}">
-                <a16:creationId xmlns:a16="http://schemas.microsoft.com/office/drawing/2014/main" id="{8BFAB6D1-EFCF-4635-A7EE-FEBE3AE09A11}"/>
-              </a:ext>
-            </a:extLst>
-          </p:cNvPr>
-          <p:cNvPicPr>
-            <a:picLocks noChangeAspect="1"/>
-          </p:cNvPicPr>
-          <p:nvPr/>
-        </p:nvPicPr>
-        <p:blipFill>
-          <a:blip r:embed="rId2"/>
-          <a:stretch>
-            <a:fillRect/>
-          </a:stretch>
-        </p:blipFill>
-        <p:spPr>
-          <a:xfrm>
-            <a:off x="70893" y="1484784"/>
-            <a:ext cx="9002214" cy="4321063"/>
-          </a:xfrm>
-          <a:prstGeom prst="rect">
-            <a:avLst/>
-          </a:prstGeom>
-        </p:spPr>
-      </p:pic>
       <p:sp>
         <p:nvSpPr>
           <p:cNvPr id="8" name="TextBox 7">
@@ -21820,6 +22503,36 @@
           </a:p>
         </p:txBody>
       </p:sp>
+      <p:pic>
+        <p:nvPicPr>
+          <p:cNvPr id="5" name="Picture 4">
+            <a:extLst>
+              <a:ext uri="{FF2B5EF4-FFF2-40B4-BE49-F238E27FC236}">
+                <a16:creationId xmlns:a16="http://schemas.microsoft.com/office/drawing/2014/main" id="{AA95CFE9-6A2B-4E5E-A278-5F091873C03D}"/>
+              </a:ext>
+            </a:extLst>
+          </p:cNvPr>
+          <p:cNvPicPr>
+            <a:picLocks noChangeAspect="1"/>
+          </p:cNvPicPr>
+          <p:nvPr/>
+        </p:nvPicPr>
+        <p:blipFill>
+          <a:blip r:embed="rId2"/>
+          <a:stretch>
+            <a:fillRect/>
+          </a:stretch>
+        </p:blipFill>
+        <p:spPr>
+          <a:xfrm>
+            <a:off x="235624" y="1484784"/>
+            <a:ext cx="8530588" cy="4240423"/>
+          </a:xfrm>
+          <a:prstGeom prst="rect">
+            <a:avLst/>
+          </a:prstGeom>
+        </p:spPr>
+      </p:pic>
     </p:spTree>
     <p:extLst>
       <p:ext uri="{BB962C8B-B14F-4D97-AF65-F5344CB8AC3E}">
@@ -22152,7 +22865,7 @@
                 <a:ea typeface="Calibri" panose="020F0502020204030204" pitchFamily="34" charset="0"/>
                 <a:cs typeface="Times New Roman" panose="02020603050405020304" pitchFamily="18" charset="0"/>
               </a:rPr>
-              <a:t> July 2016</a:t>
+              <a:t> Feb 2016</a:t>
             </a:r>
             <a:endParaRPr lang="en-US" sz="1100" dirty="0">
               <a:effectLst/>
@@ -22269,7 +22982,7 @@
                 <a:ea typeface="Calibri" panose="020F0502020204030204" pitchFamily="34" charset="0"/>
                 <a:cs typeface="Times New Roman" panose="02020603050405020304" pitchFamily="18" charset="0"/>
               </a:rPr>
-              <a:t> August 2017						27</a:t>
+              <a:t> September 2017						27</a:t>
             </a:r>
             <a:r>
               <a:rPr lang="en-US" sz="1100" b="1" baseline="30000" dirty="0">

</xml_diff>

<commit_message>
Final progress 2 slides :book:
</commit_message>
<xml_diff>
--- a/Dr. E Nduati, Superviser/Submissions/ENC222-0149_2017_OKOMO_JACOB_1234.pptx
+++ b/Dr. E Nduati, Superviser/Submissions/ENC222-0149_2017_OKOMO_JACOB_1234.pptx
@@ -6,10 +6,10 @@
     <p:sldMasterId id="2147483698" r:id="rId2"/>
   </p:sldMasterIdLst>
   <p:notesMasterIdLst>
-    <p:notesMasterId r:id="rId19"/>
+    <p:notesMasterId r:id="rId17"/>
   </p:notesMasterIdLst>
   <p:handoutMasterIdLst>
-    <p:handoutMasterId r:id="rId20"/>
+    <p:handoutMasterId r:id="rId18"/>
   </p:handoutMasterIdLst>
   <p:sldIdLst>
     <p:sldId id="353" r:id="rId3"/>
@@ -21,13 +21,11 @@
     <p:sldId id="359" r:id="rId9"/>
     <p:sldId id="365" r:id="rId10"/>
     <p:sldId id="335" r:id="rId11"/>
-    <p:sldId id="370" r:id="rId12"/>
-    <p:sldId id="372" r:id="rId13"/>
-    <p:sldId id="371" r:id="rId14"/>
-    <p:sldId id="377" r:id="rId15"/>
-    <p:sldId id="378" r:id="rId16"/>
-    <p:sldId id="376" r:id="rId17"/>
-    <p:sldId id="324" r:id="rId18"/>
+    <p:sldId id="372" r:id="rId12"/>
+    <p:sldId id="371" r:id="rId13"/>
+    <p:sldId id="378" r:id="rId14"/>
+    <p:sldId id="376" r:id="rId15"/>
+    <p:sldId id="324" r:id="rId16"/>
   </p:sldIdLst>
   <p:sldSz cx="9144000" cy="6858000" type="screen4x3"/>
   <p:notesSz cx="6858000" cy="9947275"/>
@@ -2931,7 +2929,7 @@
                 <a:ea typeface="Verdana" panose="020B0604030504040204" pitchFamily="34" charset="0"/>
                 <a:cs typeface="Verdana" panose="020B0604030504040204" pitchFamily="34" charset="0"/>
               </a:rPr>
-              <a:t>20-Oct-21</a:t>
+              <a:t>21-Oct-21</a:t>
             </a:fld>
             <a:endParaRPr lang="de-DE" sz="1000" dirty="0">
               <a:solidFill>
@@ -5021,7 +5019,7 @@
           <a:p>
             <a:fld id="{440D235E-7DEE-46BF-B2F8-FEE76BCCEBEE}" type="datetimeFigureOut">
               <a:rPr lang="en-US" smtClean="0"/>
-              <a:t>10/20/2021</a:t>
+              <a:t>10/21/2021</a:t>
             </a:fld>
             <a:endParaRPr lang="en-US"/>
           </a:p>
@@ -5219,7 +5217,7 @@
           <a:p>
             <a:fld id="{440D235E-7DEE-46BF-B2F8-FEE76BCCEBEE}" type="datetimeFigureOut">
               <a:rPr lang="en-US" smtClean="0"/>
-              <a:t>10/20/2021</a:t>
+              <a:t>10/21/2021</a:t>
             </a:fld>
             <a:endParaRPr lang="en-US"/>
           </a:p>
@@ -5494,7 +5492,7 @@
           <a:p>
             <a:fld id="{440D235E-7DEE-46BF-B2F8-FEE76BCCEBEE}" type="datetimeFigureOut">
               <a:rPr lang="en-US" smtClean="0"/>
-              <a:t>10/20/2021</a:t>
+              <a:t>10/21/2021</a:t>
             </a:fld>
             <a:endParaRPr lang="en-US"/>
           </a:p>
@@ -5926,7 +5924,7 @@
           <a:p>
             <a:fld id="{440D235E-7DEE-46BF-B2F8-FEE76BCCEBEE}" type="datetimeFigureOut">
               <a:rPr lang="en-US" smtClean="0"/>
-              <a:t>10/20/2021</a:t>
+              <a:t>10/21/2021</a:t>
             </a:fld>
             <a:endParaRPr lang="en-US"/>
           </a:p>
@@ -6338,7 +6336,7 @@
           <a:p>
             <a:fld id="{440D235E-7DEE-46BF-B2F8-FEE76BCCEBEE}" type="datetimeFigureOut">
               <a:rPr lang="en-US" smtClean="0"/>
-              <a:t>10/20/2021</a:t>
+              <a:t>10/21/2021</a:t>
             </a:fld>
             <a:endParaRPr lang="en-US"/>
           </a:p>
@@ -6479,7 +6477,7 @@
           <a:p>
             <a:fld id="{440D235E-7DEE-46BF-B2F8-FEE76BCCEBEE}" type="datetimeFigureOut">
               <a:rPr lang="en-US" smtClean="0"/>
-              <a:t>10/20/2021</a:t>
+              <a:t>10/21/2021</a:t>
             </a:fld>
             <a:endParaRPr lang="en-US"/>
           </a:p>
@@ -6592,7 +6590,7 @@
           <a:p>
             <a:fld id="{440D235E-7DEE-46BF-B2F8-FEE76BCCEBEE}" type="datetimeFigureOut">
               <a:rPr lang="en-US" smtClean="0"/>
-              <a:t>10/20/2021</a:t>
+              <a:t>10/21/2021</a:t>
             </a:fld>
             <a:endParaRPr lang="en-US"/>
           </a:p>
@@ -6903,7 +6901,7 @@
           <a:p>
             <a:fld id="{440D235E-7DEE-46BF-B2F8-FEE76BCCEBEE}" type="datetimeFigureOut">
               <a:rPr lang="en-US" smtClean="0"/>
-              <a:t>10/20/2021</a:t>
+              <a:t>10/21/2021</a:t>
             </a:fld>
             <a:endParaRPr lang="en-US"/>
           </a:p>
@@ -7191,7 +7189,7 @@
           <a:p>
             <a:fld id="{440D235E-7DEE-46BF-B2F8-FEE76BCCEBEE}" type="datetimeFigureOut">
               <a:rPr lang="en-US" smtClean="0"/>
-              <a:t>10/20/2021</a:t>
+              <a:t>10/21/2021</a:t>
             </a:fld>
             <a:endParaRPr lang="en-US"/>
           </a:p>
@@ -7389,7 +7387,7 @@
           <a:p>
             <a:fld id="{440D235E-7DEE-46BF-B2F8-FEE76BCCEBEE}" type="datetimeFigureOut">
               <a:rPr lang="en-US" smtClean="0"/>
-              <a:t>10/20/2021</a:t>
+              <a:t>10/21/2021</a:t>
             </a:fld>
             <a:endParaRPr lang="en-US"/>
           </a:p>
@@ -7597,7 +7595,7 @@
           <a:p>
             <a:fld id="{440D235E-7DEE-46BF-B2F8-FEE76BCCEBEE}" type="datetimeFigureOut">
               <a:rPr lang="en-US" smtClean="0"/>
-              <a:t>10/20/2021</a:t>
+              <a:t>10/21/2021</a:t>
             </a:fld>
             <a:endParaRPr lang="en-US"/>
           </a:p>
@@ -10339,7 +10337,7 @@
           <a:p>
             <a:fld id="{440D235E-7DEE-46BF-B2F8-FEE76BCCEBEE}" type="datetimeFigureOut">
               <a:rPr lang="en-US" smtClean="0"/>
-              <a:t>10/20/2021</a:t>
+              <a:t>10/21/2021</a:t>
             </a:fld>
             <a:endParaRPr lang="en-US"/>
           </a:p>
@@ -11494,467 +11492,6 @@
 </file>
 
 <file path=ppt/slides/slide10.xml><?xml version="1.0" encoding="utf-8"?>
-<p:sld xmlns:a="http://schemas.openxmlformats.org/drawingml/2006/main" xmlns:r="http://schemas.openxmlformats.org/officeDocument/2006/relationships" xmlns:p="http://schemas.openxmlformats.org/presentationml/2006/main">
-  <p:cSld>
-    <p:spTree>
-      <p:nvGrpSpPr>
-        <p:cNvPr id="1" name=""/>
-        <p:cNvGrpSpPr/>
-        <p:nvPr/>
-      </p:nvGrpSpPr>
-      <p:grpSpPr>
-        <a:xfrm>
-          <a:off x="0" y="0"/>
-          <a:ext cx="0" cy="0"/>
-          <a:chOff x="0" y="0"/>
-          <a:chExt cx="0" cy="0"/>
-        </a:xfrm>
-      </p:grpSpPr>
-      <p:sp>
-        <p:nvSpPr>
-          <p:cNvPr id="3" name="Footer Placeholder 2">
-            <a:extLst>
-              <a:ext uri="{FF2B5EF4-FFF2-40B4-BE49-F238E27FC236}">
-                <a16:creationId xmlns:a16="http://schemas.microsoft.com/office/drawing/2014/main" id="{94A944A6-A4C0-411B-8DAF-E71D7EC1DF75}"/>
-              </a:ext>
-            </a:extLst>
-          </p:cNvPr>
-          <p:cNvSpPr>
-            <a:spLocks noGrp="1"/>
-          </p:cNvSpPr>
-          <p:nvPr>
-            <p:ph type="ftr" sz="quarter" idx="10"/>
-          </p:nvPr>
-        </p:nvSpPr>
-        <p:spPr/>
-        <p:txBody>
-          <a:bodyPr/>
-          <a:lstStyle/>
-          <a:p>
-            <a:pPr>
-              <a:defRPr/>
-            </a:pPr>
-            <a:endParaRPr lang="de-DE"/>
-          </a:p>
-          <a:p>
-            <a:pPr>
-              <a:defRPr/>
-            </a:pPr>
-            <a:endParaRPr lang="de-DE"/>
-          </a:p>
-        </p:txBody>
-      </p:sp>
-      <p:pic>
-        <p:nvPicPr>
-          <p:cNvPr id="6" name="Picture 5">
-            <a:extLst>
-              <a:ext uri="{FF2B5EF4-FFF2-40B4-BE49-F238E27FC236}">
-                <a16:creationId xmlns:a16="http://schemas.microsoft.com/office/drawing/2014/main" id="{2139A68A-2B2A-4409-BE91-68BA3879A60C}"/>
-              </a:ext>
-            </a:extLst>
-          </p:cNvPr>
-          <p:cNvPicPr>
-            <a:picLocks noChangeAspect="1"/>
-          </p:cNvPicPr>
-          <p:nvPr/>
-        </p:nvPicPr>
-        <p:blipFill>
-          <a:blip r:embed="rId2">
-            <a:extLst>
-              <a:ext uri="{28A0092B-C50C-407E-A947-70E740481C1C}">
-                <a14:useLocalDpi xmlns:a14="http://schemas.microsoft.com/office/drawing/2010/main" val="0"/>
-              </a:ext>
-            </a:extLst>
-          </a:blip>
-          <a:stretch>
-            <a:fillRect/>
-          </a:stretch>
-        </p:blipFill>
-        <p:spPr>
-          <a:xfrm>
-            <a:off x="4718557" y="2130187"/>
-            <a:ext cx="4198230" cy="2306926"/>
-          </a:xfrm>
-          <a:prstGeom prst="rect">
-            <a:avLst/>
-          </a:prstGeom>
-        </p:spPr>
-      </p:pic>
-      <p:pic>
-        <p:nvPicPr>
-          <p:cNvPr id="7" name="Picture 6">
-            <a:extLst>
-              <a:ext uri="{FF2B5EF4-FFF2-40B4-BE49-F238E27FC236}">
-                <a16:creationId xmlns:a16="http://schemas.microsoft.com/office/drawing/2014/main" id="{6B033DDB-4ABE-4288-A8A1-5D4FAAB874A8}"/>
-              </a:ext>
-            </a:extLst>
-          </p:cNvPr>
-          <p:cNvPicPr>
-            <a:picLocks noChangeAspect="1"/>
-          </p:cNvPicPr>
-          <p:nvPr/>
-        </p:nvPicPr>
-        <p:blipFill>
-          <a:blip r:embed="rId3">
-            <a:extLst>
-              <a:ext uri="{28A0092B-C50C-407E-A947-70E740481C1C}">
-                <a14:useLocalDpi xmlns:a14="http://schemas.microsoft.com/office/drawing/2010/main" val="0"/>
-              </a:ext>
-            </a:extLst>
-          </a:blip>
-          <a:stretch>
-            <a:fillRect/>
-          </a:stretch>
-        </p:blipFill>
-        <p:spPr>
-          <a:xfrm>
-            <a:off x="104269" y="2181101"/>
-            <a:ext cx="4467731" cy="2495797"/>
-          </a:xfrm>
-          <a:prstGeom prst="rect">
-            <a:avLst/>
-          </a:prstGeom>
-        </p:spPr>
-      </p:pic>
-      <p:sp>
-        <p:nvSpPr>
-          <p:cNvPr id="8" name="Text Box 2">
-            <a:extLst>
-              <a:ext uri="{FF2B5EF4-FFF2-40B4-BE49-F238E27FC236}">
-                <a16:creationId xmlns:a16="http://schemas.microsoft.com/office/drawing/2014/main" id="{E4E6FEE5-6E0B-4C58-BFD3-09900AD925A4}"/>
-              </a:ext>
-            </a:extLst>
-          </p:cNvPr>
-          <p:cNvSpPr txBox="1">
-            <a:spLocks noChangeArrowheads="1"/>
-          </p:cNvSpPr>
-          <p:nvPr/>
-        </p:nvSpPr>
-        <p:spPr bwMode="auto">
-          <a:xfrm>
-            <a:off x="178077" y="1486314"/>
-            <a:ext cx="8712968" cy="310793"/>
-          </a:xfrm>
-          <a:prstGeom prst="rect">
-            <a:avLst/>
-          </a:prstGeom>
-          <a:solidFill>
-            <a:schemeClr val="accent2">
-              <a:lumMod val="75000"/>
-            </a:schemeClr>
-          </a:solidFill>
-          <a:ln w="9525">
-            <a:solidFill>
-              <a:schemeClr val="bg1"/>
-            </a:solidFill>
-            <a:miter lim="800000"/>
-            <a:headEnd/>
-            <a:tailEnd/>
-          </a:ln>
-        </p:spPr>
-        <p:txBody>
-          <a:bodyPr rot="0" vert="horz" wrap="square" lIns="91440" tIns="45720" rIns="91440" bIns="45720" anchor="t" anchorCtr="0">
-            <a:noAutofit/>
-          </a:bodyPr>
-          <a:lstStyle/>
-          <a:p>
-            <a:pPr marL="0" marR="0" indent="457200" algn="just">
-              <a:lnSpc>
-                <a:spcPct val="150000"/>
-              </a:lnSpc>
-              <a:spcBef>
-                <a:spcPts val="0"/>
-              </a:spcBef>
-              <a:spcAft>
-                <a:spcPts val="800"/>
-              </a:spcAft>
-            </a:pPr>
-            <a:r>
-              <a:rPr lang="en-GB" sz="1100" b="1" dirty="0">
-                <a:effectLst/>
-                <a:latin typeface="Verdana" panose="020B0604030504040204" pitchFamily="34" charset="0"/>
-                <a:ea typeface="Calibri" panose="020F0502020204030204" pitchFamily="34" charset="0"/>
-                <a:cs typeface="Times New Roman" panose="02020603050405020304" pitchFamily="18" charset="0"/>
-              </a:rPr>
-              <a:t>18</a:t>
-            </a:r>
-            <a:r>
-              <a:rPr lang="en-GB" sz="1100" b="1" baseline="30000" dirty="0">
-                <a:effectLst/>
-                <a:latin typeface="Verdana" panose="020B0604030504040204" pitchFamily="34" charset="0"/>
-                <a:ea typeface="Calibri" panose="020F0502020204030204" pitchFamily="34" charset="0"/>
-                <a:cs typeface="Times New Roman" panose="02020603050405020304" pitchFamily="18" charset="0"/>
-              </a:rPr>
-              <a:t>th</a:t>
-            </a:r>
-            <a:r>
-              <a:rPr lang="en-GB" sz="1100" b="1" dirty="0">
-                <a:effectLst/>
-                <a:latin typeface="Verdana" panose="020B0604030504040204" pitchFamily="34" charset="0"/>
-                <a:ea typeface="Calibri" panose="020F0502020204030204" pitchFamily="34" charset="0"/>
-                <a:cs typeface="Times New Roman" panose="02020603050405020304" pitchFamily="18" charset="0"/>
-              </a:rPr>
-              <a:t> August</a:t>
-            </a:r>
-            <a:r>
-              <a:rPr lang="en-US" sz="1100" b="1" dirty="0">
-                <a:effectLst/>
-                <a:latin typeface="Verdana" panose="020B0604030504040204" pitchFamily="34" charset="0"/>
-                <a:ea typeface="Calibri" panose="020F0502020204030204" pitchFamily="34" charset="0"/>
-                <a:cs typeface="Times New Roman" panose="02020603050405020304" pitchFamily="18" charset="0"/>
-              </a:rPr>
-              <a:t> 2019						29</a:t>
-            </a:r>
-            <a:r>
-              <a:rPr lang="en-US" sz="1100" b="1" baseline="30000" dirty="0">
-                <a:effectLst/>
-                <a:latin typeface="Verdana" panose="020B0604030504040204" pitchFamily="34" charset="0"/>
-                <a:ea typeface="Calibri" panose="020F0502020204030204" pitchFamily="34" charset="0"/>
-                <a:cs typeface="Times New Roman" panose="02020603050405020304" pitchFamily="18" charset="0"/>
-              </a:rPr>
-              <a:t>th</a:t>
-            </a:r>
-            <a:r>
-              <a:rPr lang="en-US" sz="1100" b="1" dirty="0">
-                <a:effectLst/>
-                <a:latin typeface="Verdana" panose="020B0604030504040204" pitchFamily="34" charset="0"/>
-                <a:ea typeface="Calibri" panose="020F0502020204030204" pitchFamily="34" charset="0"/>
-                <a:cs typeface="Times New Roman" panose="02020603050405020304" pitchFamily="18" charset="0"/>
-              </a:rPr>
-              <a:t> August 2020</a:t>
-            </a:r>
-            <a:endParaRPr lang="en-US" sz="1100" dirty="0">
-              <a:effectLst/>
-              <a:latin typeface="Verdana" panose="020B0604030504040204" pitchFamily="34" charset="0"/>
-              <a:ea typeface="Calibri" panose="020F0502020204030204" pitchFamily="34" charset="0"/>
-              <a:cs typeface="Times New Roman" panose="02020603050405020304" pitchFamily="18" charset="0"/>
-            </a:endParaRPr>
-          </a:p>
-        </p:txBody>
-      </p:sp>
-      <p:sp>
-        <p:nvSpPr>
-          <p:cNvPr id="10" name="Title 3">
-            <a:extLst>
-              <a:ext uri="{FF2B5EF4-FFF2-40B4-BE49-F238E27FC236}">
-                <a16:creationId xmlns:a16="http://schemas.microsoft.com/office/drawing/2014/main" id="{BC6EF130-4B49-4C05-A14D-1A93596876B2}"/>
-              </a:ext>
-            </a:extLst>
-          </p:cNvPr>
-          <p:cNvSpPr txBox="1">
-            <a:spLocks/>
-          </p:cNvSpPr>
-          <p:nvPr/>
-        </p:nvSpPr>
-        <p:spPr bwMode="auto">
-          <a:xfrm>
-            <a:off x="250825" y="426181"/>
-            <a:ext cx="6877050" cy="838200"/>
-          </a:xfrm>
-          <a:prstGeom prst="rect">
-            <a:avLst/>
-          </a:prstGeom>
-          <a:noFill/>
-          <a:ln>
-            <a:noFill/>
-          </a:ln>
-          <a:effectLst/>
-          <a:extLst>
-            <a:ext uri="{909E8E84-426E-40DD-AFC4-6F175D3DCCD1}">
-              <a14:hiddenFill xmlns:a14="http://schemas.microsoft.com/office/drawing/2010/main">
-                <a:solidFill>
-                  <a:schemeClr val="accent1"/>
-                </a:solidFill>
-              </a14:hiddenFill>
-            </a:ext>
-            <a:ext uri="{91240B29-F687-4F45-9708-019B960494DF}">
-              <a14:hiddenLine xmlns:a14="http://schemas.microsoft.com/office/drawing/2010/main" w="9525">
-                <a:solidFill>
-                  <a:schemeClr val="tx1"/>
-                </a:solidFill>
-                <a:miter lim="800000"/>
-                <a:headEnd/>
-                <a:tailEnd/>
-              </a14:hiddenLine>
-            </a:ext>
-            <a:ext uri="{AF507438-7753-43E0-B8FC-AC1667EBCBE1}">
-              <a14:hiddenEffects xmlns:a14="http://schemas.microsoft.com/office/drawing/2010/main">
-                <a:effectLst>
-                  <a:outerShdw dist="35921" dir="2700000" algn="ctr" rotWithShape="0">
-                    <a:schemeClr val="bg2"/>
-                  </a:outerShdw>
-                </a:effectLst>
-              </a14:hiddenEffects>
-            </a:ext>
-          </a:extLst>
-        </p:spPr>
-        <p:txBody>
-          <a:bodyPr vert="horz" wrap="square" lIns="0" tIns="0" rIns="0" bIns="0" numCol="1" anchor="ctr" anchorCtr="0" compatLnSpc="1">
-            <a:prstTxWarp prst="textNoShape">
-              <a:avLst/>
-            </a:prstTxWarp>
-          </a:bodyPr>
-          <a:lstStyle>
-            <a:lvl1pPr algn="l" rtl="0" eaLnBrk="0" fontAlgn="base" hangingPunct="0">
-              <a:spcBef>
-                <a:spcPct val="0"/>
-              </a:spcBef>
-              <a:spcAft>
-                <a:spcPct val="0"/>
-              </a:spcAft>
-              <a:defRPr sz="2300" b="1" baseline="0">
-                <a:solidFill>
-                  <a:schemeClr val="tx1"/>
-                </a:solidFill>
-                <a:latin typeface="Verdana" panose="020B0604030504040204" pitchFamily="34" charset="0"/>
-                <a:ea typeface="Verdana" panose="020B0604030504040204" pitchFamily="34" charset="0"/>
-                <a:cs typeface="Verdana" panose="020B0604030504040204" pitchFamily="34" charset="0"/>
-              </a:defRPr>
-            </a:lvl1pPr>
-            <a:lvl2pPr algn="l" rtl="0" eaLnBrk="0" fontAlgn="base" hangingPunct="0">
-              <a:spcBef>
-                <a:spcPct val="0"/>
-              </a:spcBef>
-              <a:spcAft>
-                <a:spcPct val="0"/>
-              </a:spcAft>
-              <a:defRPr sz="2400" b="1">
-                <a:solidFill>
-                  <a:schemeClr val="tx1"/>
-                </a:solidFill>
-                <a:latin typeface="Arial" charset="0"/>
-              </a:defRPr>
-            </a:lvl2pPr>
-            <a:lvl3pPr algn="l" rtl="0" eaLnBrk="0" fontAlgn="base" hangingPunct="0">
-              <a:spcBef>
-                <a:spcPct val="0"/>
-              </a:spcBef>
-              <a:spcAft>
-                <a:spcPct val="0"/>
-              </a:spcAft>
-              <a:defRPr sz="2400" b="1">
-                <a:solidFill>
-                  <a:schemeClr val="tx1"/>
-                </a:solidFill>
-                <a:latin typeface="Arial" charset="0"/>
-              </a:defRPr>
-            </a:lvl3pPr>
-            <a:lvl4pPr algn="l" rtl="0" eaLnBrk="0" fontAlgn="base" hangingPunct="0">
-              <a:spcBef>
-                <a:spcPct val="0"/>
-              </a:spcBef>
-              <a:spcAft>
-                <a:spcPct val="0"/>
-              </a:spcAft>
-              <a:defRPr sz="2400" b="1">
-                <a:solidFill>
-                  <a:schemeClr val="tx1"/>
-                </a:solidFill>
-                <a:latin typeface="Arial" charset="0"/>
-              </a:defRPr>
-            </a:lvl4pPr>
-            <a:lvl5pPr algn="l" rtl="0" eaLnBrk="0" fontAlgn="base" hangingPunct="0">
-              <a:spcBef>
-                <a:spcPct val="0"/>
-              </a:spcBef>
-              <a:spcAft>
-                <a:spcPct val="0"/>
-              </a:spcAft>
-              <a:defRPr sz="2400" b="1">
-                <a:solidFill>
-                  <a:schemeClr val="tx1"/>
-                </a:solidFill>
-                <a:latin typeface="Arial" charset="0"/>
-              </a:defRPr>
-            </a:lvl5pPr>
-            <a:lvl6pPr marL="457200" algn="l" rtl="0" fontAlgn="base">
-              <a:spcBef>
-                <a:spcPct val="0"/>
-              </a:spcBef>
-              <a:spcAft>
-                <a:spcPct val="0"/>
-              </a:spcAft>
-              <a:defRPr sz="2400" b="1">
-                <a:solidFill>
-                  <a:schemeClr val="tx1"/>
-                </a:solidFill>
-                <a:latin typeface="Arial" charset="0"/>
-              </a:defRPr>
-            </a:lvl6pPr>
-            <a:lvl7pPr marL="914400" algn="l" rtl="0" fontAlgn="base">
-              <a:spcBef>
-                <a:spcPct val="0"/>
-              </a:spcBef>
-              <a:spcAft>
-                <a:spcPct val="0"/>
-              </a:spcAft>
-              <a:defRPr sz="2400" b="1">
-                <a:solidFill>
-                  <a:schemeClr val="tx1"/>
-                </a:solidFill>
-                <a:latin typeface="Arial" charset="0"/>
-              </a:defRPr>
-            </a:lvl7pPr>
-            <a:lvl8pPr marL="1371600" algn="l" rtl="0" fontAlgn="base">
-              <a:spcBef>
-                <a:spcPct val="0"/>
-              </a:spcBef>
-              <a:spcAft>
-                <a:spcPct val="0"/>
-              </a:spcAft>
-              <a:defRPr sz="2400" b="1">
-                <a:solidFill>
-                  <a:schemeClr val="tx1"/>
-                </a:solidFill>
-                <a:latin typeface="Arial" charset="0"/>
-              </a:defRPr>
-            </a:lvl8pPr>
-            <a:lvl9pPr marL="1828800" algn="l" rtl="0" fontAlgn="base">
-              <a:spcBef>
-                <a:spcPct val="0"/>
-              </a:spcBef>
-              <a:spcAft>
-                <a:spcPct val="0"/>
-              </a:spcAft>
-              <a:defRPr sz="2400" b="1">
-                <a:solidFill>
-                  <a:schemeClr val="tx1"/>
-                </a:solidFill>
-                <a:latin typeface="Arial" charset="0"/>
-              </a:defRPr>
-            </a:lvl9pPr>
-          </a:lstStyle>
-          <a:p>
-            <a:pPr defTabSz="914400">
-              <a:lnSpc>
-                <a:spcPct val="100000"/>
-              </a:lnSpc>
-              <a:buClrTx/>
-              <a:buSzTx/>
-              <a:buFontTx/>
-            </a:pPr>
-            <a:r>
-              <a:rPr lang="en-US" kern="0"/>
-              <a:t>Results: Chl-a concentration maps </a:t>
-            </a:r>
-            <a:endParaRPr lang="en-US" kern="0" dirty="0"/>
-          </a:p>
-        </p:txBody>
-      </p:sp>
-    </p:spTree>
-    <p:extLst>
-      <p:ext uri="{BB962C8B-B14F-4D97-AF65-F5344CB8AC3E}">
-        <p14:creationId xmlns:p14="http://schemas.microsoft.com/office/powerpoint/2010/main" val="2704583551"/>
-      </p:ext>
-    </p:extLst>
-  </p:cSld>
-  <p:clrMapOvr>
-    <a:masterClrMapping/>
-  </p:clrMapOvr>
-</p:sld>
-</file>
-
-<file path=ppt/slides/slide11.xml><?xml version="1.0" encoding="utf-8"?>
 <p:sld xmlns:a="http://schemas.openxmlformats.org/drawingml/2006/main" xmlns:r="http://schemas.openxmlformats.org/officeDocument/2006/relationships" xmlns:p="http://schemas.openxmlformats.org/presentationml/2006/main">
   <p:cSld>
     <p:spTree>
@@ -12605,7 +12142,7 @@
 </p:sld>
 </file>
 
-<file path=ppt/slides/slide12.xml><?xml version="1.0" encoding="utf-8"?>
+<file path=ppt/slides/slide11.xml><?xml version="1.0" encoding="utf-8"?>
 <p:sld xmlns:a="http://schemas.openxmlformats.org/drawingml/2006/main" xmlns:r="http://schemas.openxmlformats.org/officeDocument/2006/relationships" xmlns:p="http://schemas.openxmlformats.org/presentationml/2006/main">
   <p:cSld>
     <p:spTree>
@@ -13088,292 +12625,7 @@
 </p:sld>
 </file>
 
-<file path=ppt/slides/slide13.xml><?xml version="1.0" encoding="utf-8"?>
-<p:sld xmlns:a="http://schemas.openxmlformats.org/drawingml/2006/main" xmlns:r="http://schemas.openxmlformats.org/officeDocument/2006/relationships" xmlns:p="http://schemas.openxmlformats.org/presentationml/2006/main">
-  <p:cSld>
-    <p:spTree>
-      <p:nvGrpSpPr>
-        <p:cNvPr id="1" name=""/>
-        <p:cNvGrpSpPr/>
-        <p:nvPr/>
-      </p:nvGrpSpPr>
-      <p:grpSpPr>
-        <a:xfrm>
-          <a:off x="0" y="0"/>
-          <a:ext cx="0" cy="0"/>
-          <a:chOff x="0" y="0"/>
-          <a:chExt cx="0" cy="0"/>
-        </a:xfrm>
-      </p:grpSpPr>
-      <p:sp>
-        <p:nvSpPr>
-          <p:cNvPr id="3" name="Footer Placeholder 2">
-            <a:extLst>
-              <a:ext uri="{FF2B5EF4-FFF2-40B4-BE49-F238E27FC236}">
-                <a16:creationId xmlns:a16="http://schemas.microsoft.com/office/drawing/2014/main" id="{4BB32B15-D6A0-4B3F-A858-D7187BB5EA1C}"/>
-              </a:ext>
-            </a:extLst>
-          </p:cNvPr>
-          <p:cNvSpPr>
-            <a:spLocks noGrp="1"/>
-          </p:cNvSpPr>
-          <p:nvPr>
-            <p:ph type="ftr" sz="quarter" idx="10"/>
-          </p:nvPr>
-        </p:nvSpPr>
-        <p:spPr/>
-        <p:txBody>
-          <a:bodyPr/>
-          <a:lstStyle/>
-          <a:p>
-            <a:pPr>
-              <a:defRPr/>
-            </a:pPr>
-            <a:endParaRPr lang="de-DE"/>
-          </a:p>
-          <a:p>
-            <a:pPr>
-              <a:defRPr/>
-            </a:pPr>
-            <a:endParaRPr lang="de-DE"/>
-          </a:p>
-        </p:txBody>
-      </p:sp>
-      <p:pic>
-        <p:nvPicPr>
-          <p:cNvPr id="5" name="Picture 4">
-            <a:extLst>
-              <a:ext uri="{FF2B5EF4-FFF2-40B4-BE49-F238E27FC236}">
-                <a16:creationId xmlns:a16="http://schemas.microsoft.com/office/drawing/2014/main" id="{A3252394-9748-4367-B785-2B1A0B8603C5}"/>
-              </a:ext>
-            </a:extLst>
-          </p:cNvPr>
-          <p:cNvPicPr>
-            <a:picLocks noChangeAspect="1"/>
-          </p:cNvPicPr>
-          <p:nvPr/>
-        </p:nvPicPr>
-        <p:blipFill>
-          <a:blip r:embed="rId2">
-            <a:extLst>
-              <a:ext uri="{28A0092B-C50C-407E-A947-70E740481C1C}">
-                <a14:useLocalDpi xmlns:a14="http://schemas.microsoft.com/office/drawing/2010/main" val="0"/>
-              </a:ext>
-            </a:extLst>
-          </a:blip>
-          <a:stretch>
-            <a:fillRect/>
-          </a:stretch>
-        </p:blipFill>
-        <p:spPr>
-          <a:xfrm>
-            <a:off x="250825" y="2190093"/>
-            <a:ext cx="3896360" cy="2190750"/>
-          </a:xfrm>
-          <a:prstGeom prst="rect">
-            <a:avLst/>
-          </a:prstGeom>
-        </p:spPr>
-      </p:pic>
-      <p:pic>
-        <p:nvPicPr>
-          <p:cNvPr id="6" name="Picture 5">
-            <a:extLst>
-              <a:ext uri="{FF2B5EF4-FFF2-40B4-BE49-F238E27FC236}">
-                <a16:creationId xmlns:a16="http://schemas.microsoft.com/office/drawing/2014/main" id="{8077A5A7-7235-409D-A5DC-1E644E6594CF}"/>
-              </a:ext>
-            </a:extLst>
-          </p:cNvPr>
-          <p:cNvPicPr>
-            <a:picLocks noChangeAspect="1"/>
-          </p:cNvPicPr>
-          <p:nvPr/>
-        </p:nvPicPr>
-        <p:blipFill>
-          <a:blip r:embed="rId3">
-            <a:extLst>
-              <a:ext uri="{28A0092B-C50C-407E-A947-70E740481C1C}">
-                <a14:useLocalDpi xmlns:a14="http://schemas.microsoft.com/office/drawing/2010/main" val="0"/>
-              </a:ext>
-            </a:extLst>
-          </a:blip>
-          <a:stretch>
-            <a:fillRect/>
-          </a:stretch>
-        </p:blipFill>
-        <p:spPr>
-          <a:xfrm>
-            <a:off x="4572000" y="2237718"/>
-            <a:ext cx="3765550" cy="2095500"/>
-          </a:xfrm>
-          <a:prstGeom prst="rect">
-            <a:avLst/>
-          </a:prstGeom>
-        </p:spPr>
-      </p:pic>
-      <p:sp>
-        <p:nvSpPr>
-          <p:cNvPr id="8" name="Text Box 2">
-            <a:extLst>
-              <a:ext uri="{FF2B5EF4-FFF2-40B4-BE49-F238E27FC236}">
-                <a16:creationId xmlns:a16="http://schemas.microsoft.com/office/drawing/2014/main" id="{AB4B697A-4CCD-4E18-93A9-256C0B4A76D7}"/>
-              </a:ext>
-            </a:extLst>
-          </p:cNvPr>
-          <p:cNvSpPr txBox="1">
-            <a:spLocks noChangeArrowheads="1"/>
-          </p:cNvSpPr>
-          <p:nvPr/>
-        </p:nvSpPr>
-        <p:spPr bwMode="auto">
-          <a:xfrm>
-            <a:off x="250824" y="1481562"/>
-            <a:ext cx="8641655" cy="315148"/>
-          </a:xfrm>
-          <a:prstGeom prst="rect">
-            <a:avLst/>
-          </a:prstGeom>
-          <a:solidFill>
-            <a:schemeClr val="accent2">
-              <a:lumMod val="75000"/>
-            </a:schemeClr>
-          </a:solidFill>
-          <a:ln w="9525">
-            <a:solidFill>
-              <a:schemeClr val="bg1"/>
-            </a:solidFill>
-            <a:miter lim="800000"/>
-            <a:headEnd/>
-            <a:tailEnd/>
-          </a:ln>
-        </p:spPr>
-        <p:txBody>
-          <a:bodyPr rot="0" vert="horz" wrap="square" lIns="91440" tIns="45720" rIns="91440" bIns="45720" anchor="t" anchorCtr="0">
-            <a:noAutofit/>
-          </a:bodyPr>
-          <a:lstStyle/>
-          <a:p>
-            <a:pPr marL="0" marR="0" algn="just">
-              <a:lnSpc>
-                <a:spcPct val="150000"/>
-              </a:lnSpc>
-              <a:spcBef>
-                <a:spcPts val="0"/>
-              </a:spcBef>
-              <a:spcAft>
-                <a:spcPts val="800"/>
-              </a:spcAft>
-            </a:pPr>
-            <a:r>
-              <a:rPr lang="en-GB" sz="1100" b="1" dirty="0">
-                <a:effectLst/>
-                <a:latin typeface="Verdana" panose="020B0604030504040204" pitchFamily="34" charset="0"/>
-                <a:ea typeface="Calibri" panose="020F0502020204030204" pitchFamily="34" charset="0"/>
-                <a:cs typeface="Times New Roman" panose="02020603050405020304" pitchFamily="18" charset="0"/>
-              </a:rPr>
-              <a:t>18</a:t>
-            </a:r>
-            <a:r>
-              <a:rPr lang="en-GB" sz="1100" b="1" baseline="30000" dirty="0">
-                <a:effectLst/>
-                <a:latin typeface="Verdana" panose="020B0604030504040204" pitchFamily="34" charset="0"/>
-                <a:ea typeface="Calibri" panose="020F0502020204030204" pitchFamily="34" charset="0"/>
-                <a:cs typeface="Times New Roman" panose="02020603050405020304" pitchFamily="18" charset="0"/>
-              </a:rPr>
-              <a:t>th</a:t>
-            </a:r>
-            <a:r>
-              <a:rPr lang="en-GB" sz="1100" b="1" dirty="0">
-                <a:effectLst/>
-                <a:latin typeface="Verdana" panose="020B0604030504040204" pitchFamily="34" charset="0"/>
-                <a:ea typeface="Calibri" panose="020F0502020204030204" pitchFamily="34" charset="0"/>
-                <a:cs typeface="Times New Roman" panose="02020603050405020304" pitchFamily="18" charset="0"/>
-              </a:rPr>
-              <a:t> August</a:t>
-            </a:r>
-            <a:r>
-              <a:rPr lang="en-US" sz="1100" b="1" dirty="0">
-                <a:effectLst/>
-                <a:latin typeface="Verdana" panose="020B0604030504040204" pitchFamily="34" charset="0"/>
-                <a:ea typeface="Calibri" panose="020F0502020204030204" pitchFamily="34" charset="0"/>
-                <a:cs typeface="Times New Roman" panose="02020603050405020304" pitchFamily="18" charset="0"/>
-              </a:rPr>
-              <a:t> 2019								29</a:t>
-            </a:r>
-            <a:r>
-              <a:rPr lang="en-US" sz="1100" b="1" baseline="30000" dirty="0">
-                <a:effectLst/>
-                <a:latin typeface="Verdana" panose="020B0604030504040204" pitchFamily="34" charset="0"/>
-                <a:ea typeface="Calibri" panose="020F0502020204030204" pitchFamily="34" charset="0"/>
-                <a:cs typeface="Times New Roman" panose="02020603050405020304" pitchFamily="18" charset="0"/>
-              </a:rPr>
-              <a:t>th</a:t>
-            </a:r>
-            <a:r>
-              <a:rPr lang="en-US" sz="1100" b="1" dirty="0">
-                <a:effectLst/>
-                <a:latin typeface="Verdana" panose="020B0604030504040204" pitchFamily="34" charset="0"/>
-                <a:ea typeface="Calibri" panose="020F0502020204030204" pitchFamily="34" charset="0"/>
-                <a:cs typeface="Times New Roman" panose="02020603050405020304" pitchFamily="18" charset="0"/>
-              </a:rPr>
-              <a:t> August 2020</a:t>
-            </a:r>
-            <a:endParaRPr lang="en-US" sz="1100" dirty="0">
-              <a:effectLst/>
-              <a:latin typeface="Verdana" panose="020B0604030504040204" pitchFamily="34" charset="0"/>
-              <a:ea typeface="Calibri" panose="020F0502020204030204" pitchFamily="34" charset="0"/>
-              <a:cs typeface="Times New Roman" panose="02020603050405020304" pitchFamily="18" charset="0"/>
-            </a:endParaRPr>
-          </a:p>
-        </p:txBody>
-      </p:sp>
-      <p:sp>
-        <p:nvSpPr>
-          <p:cNvPr id="9" name="Title 3">
-            <a:extLst>
-              <a:ext uri="{FF2B5EF4-FFF2-40B4-BE49-F238E27FC236}">
-                <a16:creationId xmlns:a16="http://schemas.microsoft.com/office/drawing/2014/main" id="{53A121AE-B089-4323-A71E-0CD1CB615D55}"/>
-              </a:ext>
-            </a:extLst>
-          </p:cNvPr>
-          <p:cNvSpPr>
-            <a:spLocks noGrp="1"/>
-          </p:cNvSpPr>
-          <p:nvPr>
-            <p:ph type="title"/>
-          </p:nvPr>
-        </p:nvSpPr>
-        <p:spPr>
-          <a:xfrm>
-            <a:off x="381968" y="614511"/>
-            <a:ext cx="7774310" cy="838200"/>
-          </a:xfrm>
-        </p:spPr>
-        <p:txBody>
-          <a:bodyPr/>
-          <a:lstStyle/>
-          <a:p>
-            <a:r>
-              <a:rPr lang="en-US" sz="2000" dirty="0"/>
-              <a:t>Results (b): High LSAT recorded during bloom Events</a:t>
-            </a:r>
-          </a:p>
-        </p:txBody>
-      </p:sp>
-    </p:spTree>
-    <p:extLst>
-      <p:ext uri="{BB962C8B-B14F-4D97-AF65-F5344CB8AC3E}">
-        <p14:creationId xmlns:p14="http://schemas.microsoft.com/office/powerpoint/2010/main" val="1006625658"/>
-      </p:ext>
-    </p:extLst>
-  </p:cSld>
-  <p:clrMapOvr>
-    <a:masterClrMapping/>
-  </p:clrMapOvr>
-</p:sld>
-</file>
-
-<file path=ppt/slides/slide14.xml><?xml version="1.0" encoding="utf-8"?>
+<file path=ppt/slides/slide12.xml><?xml version="1.0" encoding="utf-8"?>
 <p:sld xmlns:a="http://schemas.openxmlformats.org/drawingml/2006/main" xmlns:r="http://schemas.openxmlformats.org/officeDocument/2006/relationships" xmlns:p="http://schemas.openxmlformats.org/presentationml/2006/main">
   <p:cSld>
     <p:spTree>
@@ -14033,7 +13285,7 @@
 </p:sld>
 </file>
 
-<file path=ppt/slides/slide15.xml><?xml version="1.0" encoding="utf-8"?>
+<file path=ppt/slides/slide13.xml><?xml version="1.0" encoding="utf-8"?>
 <p:sld xmlns:a="http://schemas.openxmlformats.org/drawingml/2006/main" xmlns:r="http://schemas.openxmlformats.org/officeDocument/2006/relationships" xmlns:p="http://schemas.openxmlformats.org/presentationml/2006/main">
   <p:cSld>
     <p:spTree>
@@ -14107,17 +13359,24 @@
           <a:p>
             <a:r>
               <a:rPr lang="en-US" sz="1800" dirty="0"/>
-              <a:t>Obtaining GPS Location, Water Temp and Relative Humidity from Sensors.</a:t>
+              <a:t>Obtaining Information from Sensors:</a:t>
+            </a:r>
+            <a:br>
+              <a:rPr lang="en-US" sz="1800" dirty="0"/>
+            </a:br>
+            <a:r>
+              <a:rPr lang="en-US" sz="1800" dirty="0"/>
+              <a:t>GPS Location, System Condition, Air Temperatures</a:t>
             </a:r>
           </a:p>
         </p:txBody>
       </p:sp>
       <p:pic>
         <p:nvPicPr>
-          <p:cNvPr id="15" name="Picture 14">
+          <p:cNvPr id="12" name="Picture 11">
             <a:extLst>
               <a:ext uri="{FF2B5EF4-FFF2-40B4-BE49-F238E27FC236}">
-                <a16:creationId xmlns:a16="http://schemas.microsoft.com/office/drawing/2014/main" id="{A31B7F74-43E9-4EFA-9761-4FA72A892D81}"/>
+                <a16:creationId xmlns:a16="http://schemas.microsoft.com/office/drawing/2014/main" id="{6DC8EBDC-4671-4096-AD77-0156BA0D5498}"/>
               </a:ext>
             </a:extLst>
           </p:cNvPr>
@@ -14126,21 +13385,16 @@
           </p:cNvPicPr>
           <p:nvPr/>
         </p:nvPicPr>
-        <p:blipFill rotWithShape="1">
-          <a:blip r:embed="rId2">
-            <a:extLst>
-              <a:ext uri="{28A0092B-C50C-407E-A947-70E740481C1C}">
-                <a14:useLocalDpi xmlns:a14="http://schemas.microsoft.com/office/drawing/2010/main" val="0"/>
-              </a:ext>
-            </a:extLst>
-          </a:blip>
-          <a:srcRect r="61413" b="6806"/>
-          <a:stretch/>
+        <p:blipFill>
+          <a:blip r:embed="rId2"/>
+          <a:stretch>
+            <a:fillRect/>
+          </a:stretch>
         </p:blipFill>
         <p:spPr>
           <a:xfrm>
-            <a:off x="395536" y="1478605"/>
-            <a:ext cx="3714829" cy="5044261"/>
+            <a:off x="250825" y="1245750"/>
+            <a:ext cx="2686050" cy="5381625"/>
           </a:xfrm>
           <a:prstGeom prst="rect">
             <a:avLst/>
@@ -14149,10 +13403,10 @@
       </p:pic>
       <p:pic>
         <p:nvPicPr>
-          <p:cNvPr id="7" name="Picture 6">
+          <p:cNvPr id="14" name="Picture 13">
             <a:extLst>
               <a:ext uri="{FF2B5EF4-FFF2-40B4-BE49-F238E27FC236}">
-                <a16:creationId xmlns:a16="http://schemas.microsoft.com/office/drawing/2014/main" id="{89E429A7-9958-4E69-A70A-FDDB8422053B}"/>
+                <a16:creationId xmlns:a16="http://schemas.microsoft.com/office/drawing/2014/main" id="{808EDCA2-320E-46A7-AB3C-0C2B09EBCA95}"/>
               </a:ext>
             </a:extLst>
           </p:cNvPr>
@@ -14169,13 +13423,13 @@
               </a:ext>
             </a:extLst>
           </a:blip>
-          <a:srcRect b="18663"/>
+          <a:srcRect l="908" t="3150" r="164" b="48551"/>
           <a:stretch/>
         </p:blipFill>
         <p:spPr>
           <a:xfrm>
-            <a:off x="4427984" y="1478605"/>
-            <a:ext cx="4472940" cy="2001911"/>
+            <a:off x="3263564" y="1484784"/>
+            <a:ext cx="5226842" cy="4536504"/>
           </a:xfrm>
           <a:prstGeom prst="rect">
             <a:avLst/>
@@ -14195,7 +13449,7 @@
 </p:sld>
 </file>
 
-<file path=ppt/slides/slide16.xml><?xml version="1.0" encoding="utf-8"?>
+<file path=ppt/slides/slide14.xml><?xml version="1.0" encoding="utf-8"?>
 <p:sld xmlns:a="http://schemas.openxmlformats.org/drawingml/2006/main" xmlns:r="http://schemas.openxmlformats.org/officeDocument/2006/relationships" xmlns:p="http://schemas.openxmlformats.org/presentationml/2006/main">
   <p:cSld>
     <p:spTree>
@@ -14657,14 +13911,14 @@
                 <a:ea typeface="Calibri" panose="020F0502020204030204" pitchFamily="34" charset="0"/>
                 <a:cs typeface="Times New Roman" panose="02020603050405020304" pitchFamily="18" charset="0"/>
               </a:rPr>
-              <a:t>) 		</a:t>
+              <a:t>) &amp; Water surface spectral signatures    </a:t>
             </a:r>
             <a:r>
               <a:rPr lang="en-US" sz="1600" b="0" dirty="0">
                 <a:ea typeface="Calibri" panose="020F0502020204030204" pitchFamily="34" charset="0"/>
                 <a:cs typeface="Times New Roman" panose="02020603050405020304" pitchFamily="18" charset="0"/>
               </a:rPr>
-              <a:t>           			 </a:t>
+              <a:t> </a:t>
             </a:r>
             <a:r>
               <a:rPr lang="en-US" sz="1600" b="0" i="1" dirty="0">
@@ -15354,7 +14608,7 @@
                 <a:ea typeface="Verdana" panose="020B0604030504040204" pitchFamily="34" charset="0"/>
                 <a:cs typeface="Times New Roman" panose="02020603050405020304" pitchFamily="18" charset="0"/>
               </a:rPr>
-              <a:t> sensors, Applicable in near real-time to monitor and report </a:t>
+              <a:t> system, applicable in near real-time to monitor and report </a:t>
             </a:r>
             <a:r>
               <a:rPr lang="en-GB" sz="2400" b="0" dirty="0">
@@ -22733,42 +21987,6 @@
           </a:prstGeom>
         </p:spPr>
       </p:pic>
-      <p:pic>
-        <p:nvPicPr>
-          <p:cNvPr id="8" name="Picture 7">
-            <a:extLst>
-              <a:ext uri="{FF2B5EF4-FFF2-40B4-BE49-F238E27FC236}">
-                <a16:creationId xmlns:a16="http://schemas.microsoft.com/office/drawing/2014/main" id="{3BF6B391-8CE4-4018-A1BC-382CDE19BA98}"/>
-              </a:ext>
-            </a:extLst>
-          </p:cNvPr>
-          <p:cNvPicPr>
-            <a:picLocks noChangeAspect="1"/>
-          </p:cNvPicPr>
-          <p:nvPr/>
-        </p:nvPicPr>
-        <p:blipFill>
-          <a:blip r:embed="rId5">
-            <a:extLst>
-              <a:ext uri="{28A0092B-C50C-407E-A947-70E740481C1C}">
-                <a14:useLocalDpi xmlns:a14="http://schemas.microsoft.com/office/drawing/2010/main" val="0"/>
-              </a:ext>
-            </a:extLst>
-          </a:blip>
-          <a:stretch>
-            <a:fillRect/>
-          </a:stretch>
-        </p:blipFill>
-        <p:spPr>
-          <a:xfrm>
-            <a:off x="371433" y="4341654"/>
-            <a:ext cx="3911600" cy="2251657"/>
-          </a:xfrm>
-          <a:prstGeom prst="rect">
-            <a:avLst/>
-          </a:prstGeom>
-        </p:spPr>
-      </p:pic>
       <p:sp>
         <p:nvSpPr>
           <p:cNvPr id="9" name="Text Box 2">
@@ -23011,6 +22229,42 @@
           </a:p>
         </p:txBody>
       </p:sp>
+      <p:pic>
+        <p:nvPicPr>
+          <p:cNvPr id="11" name="Picture 10">
+            <a:extLst>
+              <a:ext uri="{FF2B5EF4-FFF2-40B4-BE49-F238E27FC236}">
+                <a16:creationId xmlns:a16="http://schemas.microsoft.com/office/drawing/2014/main" id="{36593347-6F2A-4027-9FA5-33CDAD79DBCC}"/>
+              </a:ext>
+            </a:extLst>
+          </p:cNvPr>
+          <p:cNvPicPr>
+            <a:picLocks noChangeAspect="1"/>
+          </p:cNvPicPr>
+          <p:nvPr/>
+        </p:nvPicPr>
+        <p:blipFill>
+          <a:blip r:embed="rId5">
+            <a:extLst>
+              <a:ext uri="{28A0092B-C50C-407E-A947-70E740481C1C}">
+                <a14:useLocalDpi xmlns:a14="http://schemas.microsoft.com/office/drawing/2010/main" val="0"/>
+              </a:ext>
+            </a:extLst>
+          </a:blip>
+          <a:stretch>
+            <a:fillRect/>
+          </a:stretch>
+        </p:blipFill>
+        <p:spPr>
+          <a:xfrm>
+            <a:off x="59972" y="4258963"/>
+            <a:ext cx="4198230" cy="2306926"/>
+          </a:xfrm>
+          <a:prstGeom prst="rect">
+            <a:avLst/>
+          </a:prstGeom>
+        </p:spPr>
+      </p:pic>
     </p:spTree>
     <p:extLst>
       <p:ext uri="{BB962C8B-B14F-4D97-AF65-F5344CB8AC3E}">

</xml_diff>